<commit_message>
modificação na forma de gravação do arquivo do Dashboard, para gerar em UTF-8
</commit_message>
<xml_diff>
--- a/mono/Defesa TCC - Gerador de Dashboards.pptx
+++ b/mono/Defesa TCC - Gerador de Dashboards.pptx
@@ -15,6 +15,15 @@
     <p:sldId id="263" r:id="rId9"/>
     <p:sldId id="264" r:id="rId10"/>
     <p:sldId id="265" r:id="rId11"/>
+    <p:sldId id="266" r:id="rId12"/>
+    <p:sldId id="267" r:id="rId13"/>
+    <p:sldId id="271" r:id="rId14"/>
+    <p:sldId id="272" r:id="rId15"/>
+    <p:sldId id="268" r:id="rId16"/>
+    <p:sldId id="270" r:id="rId17"/>
+    <p:sldId id="269" r:id="rId18"/>
+    <p:sldId id="273" r:id="rId19"/>
+    <p:sldId id="274" r:id="rId20"/>
   </p:sldIdLst>
   <p:sldSz cx="9144000" cy="6858000" type="screen4x3"/>
   <p:notesSz cx="6858000" cy="9144000"/>
@@ -304,7 +313,7 @@
           <a:p>
             <a:fld id="{2E700DB3-DBF0-4086-B675-117E7A9610B8}" type="datetimeFigureOut">
               <a:rPr lang="pt-BR" smtClean="0"/>
-              <a:t>25/02/2020</a:t>
+              <a:t>26/02/2020</a:t>
             </a:fld>
             <a:endParaRPr lang="pt-BR"/>
           </a:p>
@@ -504,7 +513,7 @@
           <a:p>
             <a:fld id="{2E700DB3-DBF0-4086-B675-117E7A9610B8}" type="datetimeFigureOut">
               <a:rPr lang="pt-BR" smtClean="0"/>
-              <a:t>25/02/2020</a:t>
+              <a:t>26/02/2020</a:t>
             </a:fld>
             <a:endParaRPr lang="pt-BR"/>
           </a:p>
@@ -679,7 +688,7 @@
           <a:p>
             <a:fld id="{2E700DB3-DBF0-4086-B675-117E7A9610B8}" type="datetimeFigureOut">
               <a:rPr lang="pt-BR" smtClean="0"/>
-              <a:t>25/02/2020</a:t>
+              <a:t>26/02/2020</a:t>
             </a:fld>
             <a:endParaRPr lang="pt-BR"/>
           </a:p>
@@ -844,7 +853,7 @@
           <a:p>
             <a:fld id="{2E700DB3-DBF0-4086-B675-117E7A9610B8}" type="datetimeFigureOut">
               <a:rPr lang="pt-BR" smtClean="0"/>
-              <a:t>25/02/2020</a:t>
+              <a:t>26/02/2020</a:t>
             </a:fld>
             <a:endParaRPr lang="pt-BR"/>
           </a:p>
@@ -1092,7 +1101,7 @@
           <a:p>
             <a:fld id="{2E700DB3-DBF0-4086-B675-117E7A9610B8}" type="datetimeFigureOut">
               <a:rPr lang="pt-BR" smtClean="0"/>
-              <a:t>25/02/2020</a:t>
+              <a:t>26/02/2020</a:t>
             </a:fld>
             <a:endParaRPr lang="pt-BR"/>
           </a:p>
@@ -1410,7 +1419,7 @@
           <a:p>
             <a:fld id="{2E700DB3-DBF0-4086-B675-117E7A9610B8}" type="datetimeFigureOut">
               <a:rPr lang="pt-BR" smtClean="0"/>
-              <a:t>25/02/2020</a:t>
+              <a:t>26/02/2020</a:t>
             </a:fld>
             <a:endParaRPr lang="pt-BR"/>
           </a:p>
@@ -1876,7 +1885,7 @@
           <a:p>
             <a:fld id="{2E700DB3-DBF0-4086-B675-117E7A9610B8}" type="datetimeFigureOut">
               <a:rPr lang="pt-BR" smtClean="0"/>
-              <a:t>25/02/2020</a:t>
+              <a:t>26/02/2020</a:t>
             </a:fld>
             <a:endParaRPr lang="pt-BR"/>
           </a:p>
@@ -2024,7 +2033,7 @@
           <a:p>
             <a:fld id="{2E700DB3-DBF0-4086-B675-117E7A9610B8}" type="datetimeFigureOut">
               <a:rPr lang="pt-BR" smtClean="0"/>
-              <a:t>25/02/2020</a:t>
+              <a:t>26/02/2020</a:t>
             </a:fld>
             <a:endParaRPr lang="pt-BR"/>
           </a:p>
@@ -2114,7 +2123,7 @@
           <a:p>
             <a:fld id="{2E700DB3-DBF0-4086-B675-117E7A9610B8}" type="datetimeFigureOut">
               <a:rPr lang="pt-BR" smtClean="0"/>
-              <a:t>25/02/2020</a:t>
+              <a:t>26/02/2020</a:t>
             </a:fld>
             <a:endParaRPr lang="pt-BR"/>
           </a:p>
@@ -2388,7 +2397,7 @@
           <a:p>
             <a:fld id="{2E700DB3-DBF0-4086-B675-117E7A9610B8}" type="datetimeFigureOut">
               <a:rPr lang="pt-BR" smtClean="0"/>
-              <a:t>25/02/2020</a:t>
+              <a:t>26/02/2020</a:t>
             </a:fld>
             <a:endParaRPr lang="pt-BR"/>
           </a:p>
@@ -2693,7 +2702,7 @@
           <a:p>
             <a:fld id="{2E700DB3-DBF0-4086-B675-117E7A9610B8}" type="datetimeFigureOut">
               <a:rPr lang="pt-BR" smtClean="0"/>
-              <a:t>25/02/2020</a:t>
+              <a:t>26/02/2020</a:t>
             </a:fld>
             <a:endParaRPr lang="pt-BR"/>
           </a:p>
@@ -2991,7 +3000,7 @@
           <a:p>
             <a:fld id="{2E700DB3-DBF0-4086-B675-117E7A9610B8}" type="datetimeFigureOut">
               <a:rPr lang="pt-BR" smtClean="0"/>
-              <a:t>25/02/2020</a:t>
+              <a:t>26/02/2020</a:t>
             </a:fld>
             <a:endParaRPr lang="pt-BR"/>
           </a:p>
@@ -4105,6 +4114,4058 @@
     <p:extLst>
       <p:ext uri="{BB962C8B-B14F-4D97-AF65-F5344CB8AC3E}">
         <p14:creationId xmlns:p14="http://schemas.microsoft.com/office/powerpoint/2010/main" val="35182471"/>
+      </p:ext>
+    </p:extLst>
+  </p:cSld>
+  <p:clrMapOvr>
+    <a:masterClrMapping/>
+  </p:clrMapOvr>
+  <p:timing>
+    <p:tnLst>
+      <p:par>
+        <p:cTn id="1" dur="indefinite" restart="never" nodeType="tmRoot">
+          <p:childTnLst>
+            <p:seq concurrent="1" nextAc="seek">
+              <p:cTn id="2" dur="indefinite" nodeType="mainSeq">
+                <p:childTnLst>
+                  <p:par>
+                    <p:cTn id="3" fill="hold">
+                      <p:stCondLst>
+                        <p:cond delay="indefinite"/>
+                      </p:stCondLst>
+                      <p:childTnLst>
+                        <p:par>
+                          <p:cTn id="4" fill="hold">
+                            <p:stCondLst>
+                              <p:cond delay="0"/>
+                            </p:stCondLst>
+                            <p:childTnLst>
+                              <p:par>
+                                <p:cTn id="5" presetID="10" presetClass="entr" presetSubtype="0" fill="hold" grpId="0" nodeType="clickEffect">
+                                  <p:stCondLst>
+                                    <p:cond delay="0"/>
+                                  </p:stCondLst>
+                                  <p:childTnLst>
+                                    <p:set>
+                                      <p:cBhvr>
+                                        <p:cTn id="6" dur="1" fill="hold">
+                                          <p:stCondLst>
+                                            <p:cond delay="0"/>
+                                          </p:stCondLst>
+                                        </p:cTn>
+                                        <p:tgtEl>
+                                          <p:spTgt spid="3">
+                                            <p:txEl>
+                                              <p:pRg st="0" end="0"/>
+                                            </p:txEl>
+                                          </p:spTgt>
+                                        </p:tgtEl>
+                                        <p:attrNameLst>
+                                          <p:attrName>style.visibility</p:attrName>
+                                        </p:attrNameLst>
+                                      </p:cBhvr>
+                                      <p:to>
+                                        <p:strVal val="visible"/>
+                                      </p:to>
+                                    </p:set>
+                                    <p:animEffect transition="in" filter="fade">
+                                      <p:cBhvr>
+                                        <p:cTn id="7" dur="500"/>
+                                        <p:tgtEl>
+                                          <p:spTgt spid="3">
+                                            <p:txEl>
+                                              <p:pRg st="0" end="0"/>
+                                            </p:txEl>
+                                          </p:spTgt>
+                                        </p:tgtEl>
+                                      </p:cBhvr>
+                                    </p:animEffect>
+                                  </p:childTnLst>
+                                </p:cTn>
+                              </p:par>
+                            </p:childTnLst>
+                          </p:cTn>
+                        </p:par>
+                      </p:childTnLst>
+                    </p:cTn>
+                  </p:par>
+                  <p:par>
+                    <p:cTn id="8" fill="hold">
+                      <p:stCondLst>
+                        <p:cond delay="indefinite"/>
+                      </p:stCondLst>
+                      <p:childTnLst>
+                        <p:par>
+                          <p:cTn id="9" fill="hold">
+                            <p:stCondLst>
+                              <p:cond delay="0"/>
+                            </p:stCondLst>
+                            <p:childTnLst>
+                              <p:par>
+                                <p:cTn id="10" presetID="10" presetClass="entr" presetSubtype="0" fill="hold" grpId="0" nodeType="clickEffect">
+                                  <p:stCondLst>
+                                    <p:cond delay="0"/>
+                                  </p:stCondLst>
+                                  <p:childTnLst>
+                                    <p:set>
+                                      <p:cBhvr>
+                                        <p:cTn id="11" dur="1" fill="hold">
+                                          <p:stCondLst>
+                                            <p:cond delay="0"/>
+                                          </p:stCondLst>
+                                        </p:cTn>
+                                        <p:tgtEl>
+                                          <p:spTgt spid="3">
+                                            <p:txEl>
+                                              <p:pRg st="1" end="1"/>
+                                            </p:txEl>
+                                          </p:spTgt>
+                                        </p:tgtEl>
+                                        <p:attrNameLst>
+                                          <p:attrName>style.visibility</p:attrName>
+                                        </p:attrNameLst>
+                                      </p:cBhvr>
+                                      <p:to>
+                                        <p:strVal val="visible"/>
+                                      </p:to>
+                                    </p:set>
+                                    <p:animEffect transition="in" filter="fade">
+                                      <p:cBhvr>
+                                        <p:cTn id="12" dur="500"/>
+                                        <p:tgtEl>
+                                          <p:spTgt spid="3">
+                                            <p:txEl>
+                                              <p:pRg st="1" end="1"/>
+                                            </p:txEl>
+                                          </p:spTgt>
+                                        </p:tgtEl>
+                                      </p:cBhvr>
+                                    </p:animEffect>
+                                  </p:childTnLst>
+                                </p:cTn>
+                              </p:par>
+                            </p:childTnLst>
+                          </p:cTn>
+                        </p:par>
+                      </p:childTnLst>
+                    </p:cTn>
+                  </p:par>
+                  <p:par>
+                    <p:cTn id="13" fill="hold">
+                      <p:stCondLst>
+                        <p:cond delay="indefinite"/>
+                      </p:stCondLst>
+                      <p:childTnLst>
+                        <p:par>
+                          <p:cTn id="14" fill="hold">
+                            <p:stCondLst>
+                              <p:cond delay="0"/>
+                            </p:stCondLst>
+                            <p:childTnLst>
+                              <p:par>
+                                <p:cTn id="15" presetID="10" presetClass="entr" presetSubtype="0" fill="hold" grpId="0" nodeType="clickEffect">
+                                  <p:stCondLst>
+                                    <p:cond delay="0"/>
+                                  </p:stCondLst>
+                                  <p:childTnLst>
+                                    <p:set>
+                                      <p:cBhvr>
+                                        <p:cTn id="16" dur="1" fill="hold">
+                                          <p:stCondLst>
+                                            <p:cond delay="0"/>
+                                          </p:stCondLst>
+                                        </p:cTn>
+                                        <p:tgtEl>
+                                          <p:spTgt spid="3">
+                                            <p:txEl>
+                                              <p:pRg st="2" end="2"/>
+                                            </p:txEl>
+                                          </p:spTgt>
+                                        </p:tgtEl>
+                                        <p:attrNameLst>
+                                          <p:attrName>style.visibility</p:attrName>
+                                        </p:attrNameLst>
+                                      </p:cBhvr>
+                                      <p:to>
+                                        <p:strVal val="visible"/>
+                                      </p:to>
+                                    </p:set>
+                                    <p:animEffect transition="in" filter="fade">
+                                      <p:cBhvr>
+                                        <p:cTn id="17" dur="500"/>
+                                        <p:tgtEl>
+                                          <p:spTgt spid="3">
+                                            <p:txEl>
+                                              <p:pRg st="2" end="2"/>
+                                            </p:txEl>
+                                          </p:spTgt>
+                                        </p:tgtEl>
+                                      </p:cBhvr>
+                                    </p:animEffect>
+                                  </p:childTnLst>
+                                </p:cTn>
+                              </p:par>
+                            </p:childTnLst>
+                          </p:cTn>
+                        </p:par>
+                      </p:childTnLst>
+                    </p:cTn>
+                  </p:par>
+                </p:childTnLst>
+              </p:cTn>
+              <p:prevCondLst>
+                <p:cond evt="onPrev" delay="0">
+                  <p:tgtEl>
+                    <p:sldTgt/>
+                  </p:tgtEl>
+                </p:cond>
+              </p:prevCondLst>
+              <p:nextCondLst>
+                <p:cond evt="onNext" delay="0">
+                  <p:tgtEl>
+                    <p:sldTgt/>
+                  </p:tgtEl>
+                </p:cond>
+              </p:nextCondLst>
+            </p:seq>
+          </p:childTnLst>
+        </p:cTn>
+      </p:par>
+    </p:tnLst>
+    <p:bldLst>
+      <p:bldP spid="3" grpId="0" build="p"/>
+    </p:bldLst>
+  </p:timing>
+</p:sld>
+</file>
+
+<file path=ppt/slides/slide11.xml><?xml version="1.0" encoding="utf-8"?>
+<p:sld xmlns:a="http://schemas.openxmlformats.org/drawingml/2006/main" xmlns:r="http://schemas.openxmlformats.org/officeDocument/2006/relationships" xmlns:p="http://schemas.openxmlformats.org/presentationml/2006/main">
+  <p:cSld>
+    <p:spTree>
+      <p:nvGrpSpPr>
+        <p:cNvPr id="1" name=""/>
+        <p:cNvGrpSpPr/>
+        <p:nvPr/>
+      </p:nvGrpSpPr>
+      <p:grpSpPr>
+        <a:xfrm>
+          <a:off x="0" y="0"/>
+          <a:ext cx="0" cy="0"/>
+          <a:chOff x="0" y="0"/>
+          <a:chExt cx="0" cy="0"/>
+        </a:xfrm>
+      </p:grpSpPr>
+      <p:sp>
+        <p:nvSpPr>
+          <p:cNvPr id="2" name="Título 1"/>
+          <p:cNvSpPr>
+            <a:spLocks noGrp="1"/>
+          </p:cNvSpPr>
+          <p:nvPr>
+            <p:ph type="title"/>
+          </p:nvPr>
+        </p:nvSpPr>
+        <p:spPr/>
+        <p:txBody>
+          <a:bodyPr>
+            <a:normAutofit fontScale="90000"/>
+          </a:bodyPr>
+          <a:lstStyle/>
+          <a:p>
+            <a:r>
+              <a:rPr lang="pt-BR" dirty="0" smtClean="0"/>
+              <a:t>Fundamentação Teórica</a:t>
+            </a:r>
+            <a:br>
+              <a:rPr lang="pt-BR" dirty="0" smtClean="0"/>
+            </a:br>
+            <a:r>
+              <a:rPr lang="pt-BR" sz="3600" dirty="0" smtClean="0"/>
+              <a:t>Reúso de Software – Geradores de Programas</a:t>
+            </a:r>
+            <a:endParaRPr lang="pt-BR" dirty="0"/>
+          </a:p>
+        </p:txBody>
+      </p:sp>
+      <p:sp>
+        <p:nvSpPr>
+          <p:cNvPr id="3" name="Espaço Reservado para Conteúdo 2"/>
+          <p:cNvSpPr>
+            <a:spLocks noGrp="1"/>
+          </p:cNvSpPr>
+          <p:nvPr>
+            <p:ph idx="1"/>
+          </p:nvPr>
+        </p:nvSpPr>
+        <p:spPr>
+          <a:xfrm>
+            <a:off x="457200" y="2132856"/>
+            <a:ext cx="8229600" cy="4344144"/>
+          </a:xfrm>
+        </p:spPr>
+        <p:txBody>
+          <a:bodyPr>
+            <a:normAutofit/>
+          </a:bodyPr>
+          <a:lstStyle/>
+          <a:p>
+            <a:pPr marL="0" indent="0">
+              <a:lnSpc>
+                <a:spcPct val="150000"/>
+              </a:lnSpc>
+              <a:buNone/>
+            </a:pPr>
+            <a:r>
+              <a:rPr lang="pt-BR" sz="2800" dirty="0" smtClean="0"/>
+              <a:t>Abordagem escolhida para geração do Dashboard</a:t>
+            </a:r>
+          </a:p>
+          <a:p>
+            <a:pPr>
+              <a:lnSpc>
+                <a:spcPct val="150000"/>
+              </a:lnSpc>
+            </a:pPr>
+            <a:r>
+              <a:rPr lang="pt-BR" sz="3200" b="1" dirty="0" smtClean="0"/>
+              <a:t>Programação generativa baseada em gabaritos</a:t>
+            </a:r>
+            <a:endParaRPr lang="pt-BR" sz="2800" b="1" dirty="0" smtClean="0"/>
+          </a:p>
+          <a:p>
+            <a:endParaRPr lang="pt-BR" dirty="0"/>
+          </a:p>
+        </p:txBody>
+      </p:sp>
+    </p:spTree>
+    <p:extLst>
+      <p:ext uri="{BB962C8B-B14F-4D97-AF65-F5344CB8AC3E}">
+        <p14:creationId xmlns:p14="http://schemas.microsoft.com/office/powerpoint/2010/main" val="3009619785"/>
+      </p:ext>
+    </p:extLst>
+  </p:cSld>
+  <p:clrMapOvr>
+    <a:masterClrMapping/>
+  </p:clrMapOvr>
+  <p:timing>
+    <p:tnLst>
+      <p:par>
+        <p:cTn id="1" dur="indefinite" restart="never" nodeType="tmRoot">
+          <p:childTnLst>
+            <p:seq concurrent="1" nextAc="seek">
+              <p:cTn id="2" dur="indefinite" nodeType="mainSeq">
+                <p:childTnLst>
+                  <p:par>
+                    <p:cTn id="3" fill="hold">
+                      <p:stCondLst>
+                        <p:cond delay="indefinite"/>
+                      </p:stCondLst>
+                      <p:childTnLst>
+                        <p:par>
+                          <p:cTn id="4" fill="hold">
+                            <p:stCondLst>
+                              <p:cond delay="0"/>
+                            </p:stCondLst>
+                            <p:childTnLst>
+                              <p:par>
+                                <p:cTn id="5" presetID="10" presetClass="entr" presetSubtype="0" fill="hold" grpId="0" nodeType="clickEffect">
+                                  <p:stCondLst>
+                                    <p:cond delay="0"/>
+                                  </p:stCondLst>
+                                  <p:childTnLst>
+                                    <p:set>
+                                      <p:cBhvr>
+                                        <p:cTn id="6" dur="1" fill="hold">
+                                          <p:stCondLst>
+                                            <p:cond delay="0"/>
+                                          </p:stCondLst>
+                                        </p:cTn>
+                                        <p:tgtEl>
+                                          <p:spTgt spid="3">
+                                            <p:txEl>
+                                              <p:pRg st="0" end="0"/>
+                                            </p:txEl>
+                                          </p:spTgt>
+                                        </p:tgtEl>
+                                        <p:attrNameLst>
+                                          <p:attrName>style.visibility</p:attrName>
+                                        </p:attrNameLst>
+                                      </p:cBhvr>
+                                      <p:to>
+                                        <p:strVal val="visible"/>
+                                      </p:to>
+                                    </p:set>
+                                    <p:animEffect transition="in" filter="fade">
+                                      <p:cBhvr>
+                                        <p:cTn id="7" dur="500"/>
+                                        <p:tgtEl>
+                                          <p:spTgt spid="3">
+                                            <p:txEl>
+                                              <p:pRg st="0" end="0"/>
+                                            </p:txEl>
+                                          </p:spTgt>
+                                        </p:tgtEl>
+                                      </p:cBhvr>
+                                    </p:animEffect>
+                                  </p:childTnLst>
+                                </p:cTn>
+                              </p:par>
+                            </p:childTnLst>
+                          </p:cTn>
+                        </p:par>
+                      </p:childTnLst>
+                    </p:cTn>
+                  </p:par>
+                  <p:par>
+                    <p:cTn id="8" fill="hold">
+                      <p:stCondLst>
+                        <p:cond delay="indefinite"/>
+                      </p:stCondLst>
+                      <p:childTnLst>
+                        <p:par>
+                          <p:cTn id="9" fill="hold">
+                            <p:stCondLst>
+                              <p:cond delay="0"/>
+                            </p:stCondLst>
+                            <p:childTnLst>
+                              <p:par>
+                                <p:cTn id="10" presetID="10" presetClass="entr" presetSubtype="0" fill="hold" grpId="0" nodeType="clickEffect">
+                                  <p:stCondLst>
+                                    <p:cond delay="0"/>
+                                  </p:stCondLst>
+                                  <p:childTnLst>
+                                    <p:set>
+                                      <p:cBhvr>
+                                        <p:cTn id="11" dur="1" fill="hold">
+                                          <p:stCondLst>
+                                            <p:cond delay="0"/>
+                                          </p:stCondLst>
+                                        </p:cTn>
+                                        <p:tgtEl>
+                                          <p:spTgt spid="3">
+                                            <p:txEl>
+                                              <p:pRg st="1" end="1"/>
+                                            </p:txEl>
+                                          </p:spTgt>
+                                        </p:tgtEl>
+                                        <p:attrNameLst>
+                                          <p:attrName>style.visibility</p:attrName>
+                                        </p:attrNameLst>
+                                      </p:cBhvr>
+                                      <p:to>
+                                        <p:strVal val="visible"/>
+                                      </p:to>
+                                    </p:set>
+                                    <p:animEffect transition="in" filter="fade">
+                                      <p:cBhvr>
+                                        <p:cTn id="12" dur="500"/>
+                                        <p:tgtEl>
+                                          <p:spTgt spid="3">
+                                            <p:txEl>
+                                              <p:pRg st="1" end="1"/>
+                                            </p:txEl>
+                                          </p:spTgt>
+                                        </p:tgtEl>
+                                      </p:cBhvr>
+                                    </p:animEffect>
+                                  </p:childTnLst>
+                                </p:cTn>
+                              </p:par>
+                            </p:childTnLst>
+                          </p:cTn>
+                        </p:par>
+                      </p:childTnLst>
+                    </p:cTn>
+                  </p:par>
+                </p:childTnLst>
+              </p:cTn>
+              <p:prevCondLst>
+                <p:cond evt="onPrev" delay="0">
+                  <p:tgtEl>
+                    <p:sldTgt/>
+                  </p:tgtEl>
+                </p:cond>
+              </p:prevCondLst>
+              <p:nextCondLst>
+                <p:cond evt="onNext" delay="0">
+                  <p:tgtEl>
+                    <p:sldTgt/>
+                  </p:tgtEl>
+                </p:cond>
+              </p:nextCondLst>
+            </p:seq>
+          </p:childTnLst>
+        </p:cTn>
+      </p:par>
+    </p:tnLst>
+    <p:bldLst>
+      <p:bldP spid="3" grpId="0" build="p"/>
+    </p:bldLst>
+  </p:timing>
+</p:sld>
+</file>
+
+<file path=ppt/slides/slide12.xml><?xml version="1.0" encoding="utf-8"?>
+<p:sld xmlns:a="http://schemas.openxmlformats.org/drawingml/2006/main" xmlns:r="http://schemas.openxmlformats.org/officeDocument/2006/relationships" xmlns:p="http://schemas.openxmlformats.org/presentationml/2006/main">
+  <p:cSld>
+    <p:spTree>
+      <p:nvGrpSpPr>
+        <p:cNvPr id="1" name=""/>
+        <p:cNvGrpSpPr/>
+        <p:nvPr/>
+      </p:nvGrpSpPr>
+      <p:grpSpPr>
+        <a:xfrm>
+          <a:off x="0" y="0"/>
+          <a:ext cx="0" cy="0"/>
+          <a:chOff x="0" y="0"/>
+          <a:chExt cx="0" cy="0"/>
+        </a:xfrm>
+      </p:grpSpPr>
+      <p:sp>
+        <p:nvSpPr>
+          <p:cNvPr id="2" name="Título 1"/>
+          <p:cNvSpPr>
+            <a:spLocks noGrp="1"/>
+          </p:cNvSpPr>
+          <p:nvPr>
+            <p:ph type="title"/>
+          </p:nvPr>
+        </p:nvSpPr>
+        <p:spPr/>
+        <p:txBody>
+          <a:bodyPr>
+            <a:normAutofit fontScale="90000"/>
+          </a:bodyPr>
+          <a:lstStyle/>
+          <a:p>
+            <a:r>
+              <a:rPr lang="pt-BR" dirty="0" smtClean="0"/>
+              <a:t>Fundamentação Teórica</a:t>
+            </a:r>
+            <a:br>
+              <a:rPr lang="pt-BR" dirty="0" smtClean="0"/>
+            </a:br>
+            <a:r>
+              <a:rPr lang="pt-BR" sz="3100" dirty="0" smtClean="0"/>
+              <a:t>Programação Generativa Baseada em Gabaritos</a:t>
+            </a:r>
+            <a:endParaRPr lang="pt-BR" dirty="0"/>
+          </a:p>
+        </p:txBody>
+      </p:sp>
+      <p:sp>
+        <p:nvSpPr>
+          <p:cNvPr id="3" name="Espaço Reservado para Conteúdo 2"/>
+          <p:cNvSpPr>
+            <a:spLocks noGrp="1"/>
+          </p:cNvSpPr>
+          <p:nvPr>
+            <p:ph idx="1"/>
+          </p:nvPr>
+        </p:nvSpPr>
+        <p:spPr>
+          <a:xfrm>
+            <a:off x="457200" y="2132856"/>
+            <a:ext cx="8229600" cy="4248472"/>
+          </a:xfrm>
+        </p:spPr>
+        <p:txBody>
+          <a:bodyPr>
+            <a:normAutofit/>
+          </a:bodyPr>
+          <a:lstStyle/>
+          <a:p>
+            <a:r>
+              <a:rPr lang="pt-BR" dirty="0"/>
+              <a:t>Gabaritos consistem em partes parcialmente prontas do produto, com marcações que são substituídas por parâmetros fornecidos ao gerador, que faz a composição, gerando o produto final concluído (LUCRÉDIO, 2009).</a:t>
+            </a:r>
+          </a:p>
+          <a:p>
+            <a:pPr marL="0" indent="0">
+              <a:buNone/>
+            </a:pPr>
+            <a:endParaRPr lang="pt-BR" dirty="0" smtClean="0"/>
+          </a:p>
+          <a:p>
+            <a:pPr marL="0" indent="0">
+              <a:buNone/>
+            </a:pPr>
+            <a:r>
+              <a:rPr lang="pt-BR" dirty="0" smtClean="0"/>
+              <a:t>Para aplicar a geração de código baseada em gabaritos, utilizamos </a:t>
+            </a:r>
+          </a:p>
+          <a:p>
+            <a:pPr marL="0" indent="0" algn="ctr">
+              <a:buNone/>
+            </a:pPr>
+            <a:r>
+              <a:rPr lang="pt-BR" sz="4000" dirty="0" smtClean="0"/>
+              <a:t>MOTORES DE GABARITOS (TEMPLATE ENGINES)</a:t>
+            </a:r>
+            <a:r>
+              <a:rPr lang="pt-BR" dirty="0" smtClean="0"/>
+              <a:t> </a:t>
+            </a:r>
+            <a:endParaRPr lang="pt-BR" dirty="0"/>
+          </a:p>
+        </p:txBody>
+      </p:sp>
+    </p:spTree>
+    <p:extLst>
+      <p:ext uri="{BB962C8B-B14F-4D97-AF65-F5344CB8AC3E}">
+        <p14:creationId xmlns:p14="http://schemas.microsoft.com/office/powerpoint/2010/main" val="3675531021"/>
+      </p:ext>
+    </p:extLst>
+  </p:cSld>
+  <p:clrMapOvr>
+    <a:masterClrMapping/>
+  </p:clrMapOvr>
+  <p:timing>
+    <p:tnLst>
+      <p:par>
+        <p:cTn id="1" dur="indefinite" restart="never" nodeType="tmRoot">
+          <p:childTnLst>
+            <p:seq concurrent="1" nextAc="seek">
+              <p:cTn id="2" dur="indefinite" nodeType="mainSeq">
+                <p:childTnLst>
+                  <p:par>
+                    <p:cTn id="3" fill="hold">
+                      <p:stCondLst>
+                        <p:cond delay="indefinite"/>
+                      </p:stCondLst>
+                      <p:childTnLst>
+                        <p:par>
+                          <p:cTn id="4" fill="hold">
+                            <p:stCondLst>
+                              <p:cond delay="0"/>
+                            </p:stCondLst>
+                            <p:childTnLst>
+                              <p:par>
+                                <p:cTn id="5" presetID="10" presetClass="entr" presetSubtype="0" fill="hold" grpId="0" nodeType="clickEffect">
+                                  <p:stCondLst>
+                                    <p:cond delay="0"/>
+                                  </p:stCondLst>
+                                  <p:childTnLst>
+                                    <p:set>
+                                      <p:cBhvr>
+                                        <p:cTn id="6" dur="1" fill="hold">
+                                          <p:stCondLst>
+                                            <p:cond delay="0"/>
+                                          </p:stCondLst>
+                                        </p:cTn>
+                                        <p:tgtEl>
+                                          <p:spTgt spid="3">
+                                            <p:txEl>
+                                              <p:pRg st="0" end="0"/>
+                                            </p:txEl>
+                                          </p:spTgt>
+                                        </p:tgtEl>
+                                        <p:attrNameLst>
+                                          <p:attrName>style.visibility</p:attrName>
+                                        </p:attrNameLst>
+                                      </p:cBhvr>
+                                      <p:to>
+                                        <p:strVal val="visible"/>
+                                      </p:to>
+                                    </p:set>
+                                    <p:animEffect transition="in" filter="fade">
+                                      <p:cBhvr>
+                                        <p:cTn id="7" dur="500"/>
+                                        <p:tgtEl>
+                                          <p:spTgt spid="3">
+                                            <p:txEl>
+                                              <p:pRg st="0" end="0"/>
+                                            </p:txEl>
+                                          </p:spTgt>
+                                        </p:tgtEl>
+                                      </p:cBhvr>
+                                    </p:animEffect>
+                                  </p:childTnLst>
+                                </p:cTn>
+                              </p:par>
+                            </p:childTnLst>
+                          </p:cTn>
+                        </p:par>
+                      </p:childTnLst>
+                    </p:cTn>
+                  </p:par>
+                  <p:par>
+                    <p:cTn id="8" fill="hold">
+                      <p:stCondLst>
+                        <p:cond delay="indefinite"/>
+                      </p:stCondLst>
+                      <p:childTnLst>
+                        <p:par>
+                          <p:cTn id="9" fill="hold">
+                            <p:stCondLst>
+                              <p:cond delay="0"/>
+                            </p:stCondLst>
+                            <p:childTnLst>
+                              <p:par>
+                                <p:cTn id="10" presetID="10" presetClass="entr" presetSubtype="0" fill="hold" grpId="0" nodeType="clickEffect">
+                                  <p:stCondLst>
+                                    <p:cond delay="0"/>
+                                  </p:stCondLst>
+                                  <p:childTnLst>
+                                    <p:set>
+                                      <p:cBhvr>
+                                        <p:cTn id="11" dur="1" fill="hold">
+                                          <p:stCondLst>
+                                            <p:cond delay="0"/>
+                                          </p:stCondLst>
+                                        </p:cTn>
+                                        <p:tgtEl>
+                                          <p:spTgt spid="3">
+                                            <p:txEl>
+                                              <p:pRg st="2" end="2"/>
+                                            </p:txEl>
+                                          </p:spTgt>
+                                        </p:tgtEl>
+                                        <p:attrNameLst>
+                                          <p:attrName>style.visibility</p:attrName>
+                                        </p:attrNameLst>
+                                      </p:cBhvr>
+                                      <p:to>
+                                        <p:strVal val="visible"/>
+                                      </p:to>
+                                    </p:set>
+                                    <p:animEffect transition="in" filter="fade">
+                                      <p:cBhvr>
+                                        <p:cTn id="12" dur="500"/>
+                                        <p:tgtEl>
+                                          <p:spTgt spid="3">
+                                            <p:txEl>
+                                              <p:pRg st="2" end="2"/>
+                                            </p:txEl>
+                                          </p:spTgt>
+                                        </p:tgtEl>
+                                      </p:cBhvr>
+                                    </p:animEffect>
+                                  </p:childTnLst>
+                                </p:cTn>
+                              </p:par>
+                            </p:childTnLst>
+                          </p:cTn>
+                        </p:par>
+                      </p:childTnLst>
+                    </p:cTn>
+                  </p:par>
+                  <p:par>
+                    <p:cTn id="13" fill="hold">
+                      <p:stCondLst>
+                        <p:cond delay="indefinite"/>
+                      </p:stCondLst>
+                      <p:childTnLst>
+                        <p:par>
+                          <p:cTn id="14" fill="hold">
+                            <p:stCondLst>
+                              <p:cond delay="0"/>
+                            </p:stCondLst>
+                            <p:childTnLst>
+                              <p:par>
+                                <p:cTn id="15" presetID="10" presetClass="entr" presetSubtype="0" fill="hold" grpId="0" nodeType="clickEffect">
+                                  <p:stCondLst>
+                                    <p:cond delay="0"/>
+                                  </p:stCondLst>
+                                  <p:childTnLst>
+                                    <p:set>
+                                      <p:cBhvr>
+                                        <p:cTn id="16" dur="1" fill="hold">
+                                          <p:stCondLst>
+                                            <p:cond delay="0"/>
+                                          </p:stCondLst>
+                                        </p:cTn>
+                                        <p:tgtEl>
+                                          <p:spTgt spid="3">
+                                            <p:txEl>
+                                              <p:pRg st="3" end="3"/>
+                                            </p:txEl>
+                                          </p:spTgt>
+                                        </p:tgtEl>
+                                        <p:attrNameLst>
+                                          <p:attrName>style.visibility</p:attrName>
+                                        </p:attrNameLst>
+                                      </p:cBhvr>
+                                      <p:to>
+                                        <p:strVal val="visible"/>
+                                      </p:to>
+                                    </p:set>
+                                    <p:animEffect transition="in" filter="fade">
+                                      <p:cBhvr>
+                                        <p:cTn id="17" dur="500"/>
+                                        <p:tgtEl>
+                                          <p:spTgt spid="3">
+                                            <p:txEl>
+                                              <p:pRg st="3" end="3"/>
+                                            </p:txEl>
+                                          </p:spTgt>
+                                        </p:tgtEl>
+                                      </p:cBhvr>
+                                    </p:animEffect>
+                                  </p:childTnLst>
+                                </p:cTn>
+                              </p:par>
+                            </p:childTnLst>
+                          </p:cTn>
+                        </p:par>
+                      </p:childTnLst>
+                    </p:cTn>
+                  </p:par>
+                </p:childTnLst>
+              </p:cTn>
+              <p:prevCondLst>
+                <p:cond evt="onPrev" delay="0">
+                  <p:tgtEl>
+                    <p:sldTgt/>
+                  </p:tgtEl>
+                </p:cond>
+              </p:prevCondLst>
+              <p:nextCondLst>
+                <p:cond evt="onNext" delay="0">
+                  <p:tgtEl>
+                    <p:sldTgt/>
+                  </p:tgtEl>
+                </p:cond>
+              </p:nextCondLst>
+            </p:seq>
+          </p:childTnLst>
+        </p:cTn>
+      </p:par>
+    </p:tnLst>
+    <p:bldLst>
+      <p:bldP spid="3" grpId="0" build="p"/>
+    </p:bldLst>
+  </p:timing>
+</p:sld>
+</file>
+
+<file path=ppt/slides/slide13.xml><?xml version="1.0" encoding="utf-8"?>
+<p:sld xmlns:a="http://schemas.openxmlformats.org/drawingml/2006/main" xmlns:r="http://schemas.openxmlformats.org/officeDocument/2006/relationships" xmlns:p="http://schemas.openxmlformats.org/presentationml/2006/main">
+  <p:cSld>
+    <p:spTree>
+      <p:nvGrpSpPr>
+        <p:cNvPr id="1" name=""/>
+        <p:cNvGrpSpPr/>
+        <p:nvPr/>
+      </p:nvGrpSpPr>
+      <p:grpSpPr>
+        <a:xfrm>
+          <a:off x="0" y="0"/>
+          <a:ext cx="0" cy="0"/>
+          <a:chOff x="0" y="0"/>
+          <a:chExt cx="0" cy="0"/>
+        </a:xfrm>
+      </p:grpSpPr>
+      <p:sp>
+        <p:nvSpPr>
+          <p:cNvPr id="2" name="Título 1"/>
+          <p:cNvSpPr>
+            <a:spLocks noGrp="1"/>
+          </p:cNvSpPr>
+          <p:nvPr>
+            <p:ph type="title"/>
+          </p:nvPr>
+        </p:nvSpPr>
+        <p:spPr/>
+        <p:txBody>
+          <a:bodyPr>
+            <a:normAutofit fontScale="90000"/>
+          </a:bodyPr>
+          <a:lstStyle/>
+          <a:p>
+            <a:r>
+              <a:rPr lang="pt-BR" dirty="0" smtClean="0"/>
+              <a:t>Fundamentação Teórica</a:t>
+            </a:r>
+            <a:br>
+              <a:rPr lang="pt-BR" dirty="0" smtClean="0"/>
+            </a:br>
+            <a:r>
+              <a:rPr lang="pt-BR" sz="3100" dirty="0" smtClean="0"/>
+              <a:t>Motores de Gabaritos</a:t>
+            </a:r>
+            <a:endParaRPr lang="pt-BR" dirty="0"/>
+          </a:p>
+        </p:txBody>
+      </p:sp>
+      <p:sp>
+        <p:nvSpPr>
+          <p:cNvPr id="3" name="Espaço Reservado para Conteúdo 2"/>
+          <p:cNvSpPr>
+            <a:spLocks noGrp="1"/>
+          </p:cNvSpPr>
+          <p:nvPr>
+            <p:ph idx="1"/>
+          </p:nvPr>
+        </p:nvSpPr>
+        <p:spPr>
+          <a:xfrm>
+            <a:off x="457200" y="2132856"/>
+            <a:ext cx="8229600" cy="2952328"/>
+          </a:xfrm>
+        </p:spPr>
+        <p:txBody>
+          <a:bodyPr>
+            <a:noAutofit/>
+          </a:bodyPr>
+          <a:lstStyle/>
+          <a:p>
+            <a:r>
+              <a:rPr lang="pt-BR" sz="3200" dirty="0"/>
+              <a:t>partes ou componentes de software que têm a função de combinar um ou mais gabaritos com um dado modelo de dados, gerando um ou mais artefatos de saída como resultado de seu processamento(WIKIPEDIA.ORG, 2020). </a:t>
+            </a:r>
+            <a:endParaRPr lang="pt-BR" sz="3200" dirty="0"/>
+          </a:p>
+        </p:txBody>
+      </p:sp>
+    </p:spTree>
+    <p:extLst>
+      <p:ext uri="{BB962C8B-B14F-4D97-AF65-F5344CB8AC3E}">
+        <p14:creationId xmlns:p14="http://schemas.microsoft.com/office/powerpoint/2010/main" val="1865845751"/>
+      </p:ext>
+    </p:extLst>
+  </p:cSld>
+  <p:clrMapOvr>
+    <a:masterClrMapping/>
+  </p:clrMapOvr>
+  <p:timing>
+    <p:tnLst>
+      <p:par>
+        <p:cTn id="1" dur="indefinite" restart="never" nodeType="tmRoot">
+          <p:childTnLst>
+            <p:seq concurrent="1" nextAc="seek">
+              <p:cTn id="2" dur="indefinite" nodeType="mainSeq">
+                <p:childTnLst>
+                  <p:par>
+                    <p:cTn id="3" fill="hold">
+                      <p:stCondLst>
+                        <p:cond delay="indefinite"/>
+                      </p:stCondLst>
+                      <p:childTnLst>
+                        <p:par>
+                          <p:cTn id="4" fill="hold">
+                            <p:stCondLst>
+                              <p:cond delay="0"/>
+                            </p:stCondLst>
+                            <p:childTnLst>
+                              <p:par>
+                                <p:cTn id="5" presetID="10" presetClass="entr" presetSubtype="0" fill="hold" grpId="0" nodeType="clickEffect">
+                                  <p:stCondLst>
+                                    <p:cond delay="0"/>
+                                  </p:stCondLst>
+                                  <p:childTnLst>
+                                    <p:set>
+                                      <p:cBhvr>
+                                        <p:cTn id="6" dur="1" fill="hold">
+                                          <p:stCondLst>
+                                            <p:cond delay="0"/>
+                                          </p:stCondLst>
+                                        </p:cTn>
+                                        <p:tgtEl>
+                                          <p:spTgt spid="3">
+                                            <p:txEl>
+                                              <p:pRg st="0" end="0"/>
+                                            </p:txEl>
+                                          </p:spTgt>
+                                        </p:tgtEl>
+                                        <p:attrNameLst>
+                                          <p:attrName>style.visibility</p:attrName>
+                                        </p:attrNameLst>
+                                      </p:cBhvr>
+                                      <p:to>
+                                        <p:strVal val="visible"/>
+                                      </p:to>
+                                    </p:set>
+                                    <p:animEffect transition="in" filter="fade">
+                                      <p:cBhvr>
+                                        <p:cTn id="7" dur="500"/>
+                                        <p:tgtEl>
+                                          <p:spTgt spid="3">
+                                            <p:txEl>
+                                              <p:pRg st="0" end="0"/>
+                                            </p:txEl>
+                                          </p:spTgt>
+                                        </p:tgtEl>
+                                      </p:cBhvr>
+                                    </p:animEffect>
+                                  </p:childTnLst>
+                                </p:cTn>
+                              </p:par>
+                            </p:childTnLst>
+                          </p:cTn>
+                        </p:par>
+                      </p:childTnLst>
+                    </p:cTn>
+                  </p:par>
+                </p:childTnLst>
+              </p:cTn>
+              <p:prevCondLst>
+                <p:cond evt="onPrev" delay="0">
+                  <p:tgtEl>
+                    <p:sldTgt/>
+                  </p:tgtEl>
+                </p:cond>
+              </p:prevCondLst>
+              <p:nextCondLst>
+                <p:cond evt="onNext" delay="0">
+                  <p:tgtEl>
+                    <p:sldTgt/>
+                  </p:tgtEl>
+                </p:cond>
+              </p:nextCondLst>
+            </p:seq>
+          </p:childTnLst>
+        </p:cTn>
+      </p:par>
+    </p:tnLst>
+    <p:bldLst>
+      <p:bldP spid="3" grpId="0" build="p"/>
+    </p:bldLst>
+  </p:timing>
+</p:sld>
+</file>
+
+<file path=ppt/slides/slide14.xml><?xml version="1.0" encoding="utf-8"?>
+<p:sld xmlns:a="http://schemas.openxmlformats.org/drawingml/2006/main" xmlns:r="http://schemas.openxmlformats.org/officeDocument/2006/relationships" xmlns:p="http://schemas.openxmlformats.org/presentationml/2006/main">
+  <p:cSld>
+    <p:spTree>
+      <p:nvGrpSpPr>
+        <p:cNvPr id="1" name=""/>
+        <p:cNvGrpSpPr/>
+        <p:nvPr/>
+      </p:nvGrpSpPr>
+      <p:grpSpPr>
+        <a:xfrm>
+          <a:off x="0" y="0"/>
+          <a:ext cx="0" cy="0"/>
+          <a:chOff x="0" y="0"/>
+          <a:chExt cx="0" cy="0"/>
+        </a:xfrm>
+      </p:grpSpPr>
+      <p:sp>
+        <p:nvSpPr>
+          <p:cNvPr id="2" name="Título 1"/>
+          <p:cNvSpPr>
+            <a:spLocks noGrp="1"/>
+          </p:cNvSpPr>
+          <p:nvPr>
+            <p:ph type="title"/>
+          </p:nvPr>
+        </p:nvSpPr>
+        <p:spPr/>
+        <p:txBody>
+          <a:bodyPr>
+            <a:normAutofit fontScale="90000"/>
+          </a:bodyPr>
+          <a:lstStyle/>
+          <a:p>
+            <a:r>
+              <a:rPr lang="pt-BR" dirty="0" smtClean="0"/>
+              <a:t>Fundamentação Teórica</a:t>
+            </a:r>
+            <a:br>
+              <a:rPr lang="pt-BR" dirty="0" smtClean="0"/>
+            </a:br>
+            <a:r>
+              <a:rPr lang="pt-BR" sz="3100" dirty="0" smtClean="0"/>
+              <a:t>Motores de Gabaritos</a:t>
+            </a:r>
+            <a:endParaRPr lang="pt-BR" dirty="0"/>
+          </a:p>
+        </p:txBody>
+      </p:sp>
+      <p:sp>
+        <p:nvSpPr>
+          <p:cNvPr id="3" name="Espaço Reservado para Conteúdo 2"/>
+          <p:cNvSpPr>
+            <a:spLocks noGrp="1"/>
+          </p:cNvSpPr>
+          <p:nvPr>
+            <p:ph idx="1"/>
+          </p:nvPr>
+        </p:nvSpPr>
+        <p:spPr>
+          <a:xfrm>
+            <a:off x="457200" y="2636912"/>
+            <a:ext cx="8229600" cy="2448272"/>
+          </a:xfrm>
+        </p:spPr>
+        <p:txBody>
+          <a:bodyPr>
+            <a:noAutofit/>
+          </a:bodyPr>
+          <a:lstStyle/>
+          <a:p>
+            <a:r>
+              <a:rPr lang="pt-BR" sz="2800" dirty="0" smtClean="0"/>
+              <a:t>Um modelo de dados associado</a:t>
+            </a:r>
+          </a:p>
+          <a:p>
+            <a:r>
+              <a:rPr lang="pt-BR" sz="2800" dirty="0" smtClean="0"/>
+              <a:t>Um ou mais gabaritos fonte</a:t>
+            </a:r>
+          </a:p>
+          <a:p>
+            <a:r>
+              <a:rPr lang="pt-BR" sz="2800" dirty="0" smtClean="0"/>
+              <a:t>Um processador ou motor de gabaritos</a:t>
+            </a:r>
+          </a:p>
+          <a:p>
+            <a:r>
+              <a:rPr lang="pt-BR" sz="2800" dirty="0" smtClean="0"/>
+              <a:t>Documento final gerado(WIKIPEDIA.ORG</a:t>
+            </a:r>
+            <a:r>
+              <a:rPr lang="pt-BR" sz="2800" dirty="0"/>
+              <a:t>, 2020). </a:t>
+            </a:r>
+            <a:endParaRPr lang="pt-BR" sz="2800" dirty="0"/>
+          </a:p>
+        </p:txBody>
+      </p:sp>
+      <p:sp>
+        <p:nvSpPr>
+          <p:cNvPr id="4" name="CaixaDeTexto 3"/>
+          <p:cNvSpPr txBox="1"/>
+          <p:nvPr/>
+        </p:nvSpPr>
+        <p:spPr>
+          <a:xfrm>
+            <a:off x="251520" y="1628800"/>
+            <a:ext cx="6702476" cy="523220"/>
+          </a:xfrm>
+          <a:prstGeom prst="rect">
+            <a:avLst/>
+          </a:prstGeom>
+          <a:noFill/>
+        </p:spPr>
+        <p:txBody>
+          <a:bodyPr wrap="none" rtlCol="0">
+            <a:spAutoFit/>
+          </a:bodyPr>
+          <a:lstStyle/>
+          <a:p>
+            <a:r>
+              <a:rPr lang="pt-BR" sz="2800" dirty="0" smtClean="0"/>
+              <a:t>Sistema de processamento de Gabaritos</a:t>
+            </a:r>
+            <a:endParaRPr lang="pt-BR" sz="2800" dirty="0"/>
+          </a:p>
+        </p:txBody>
+      </p:sp>
+    </p:spTree>
+    <p:extLst>
+      <p:ext uri="{BB962C8B-B14F-4D97-AF65-F5344CB8AC3E}">
+        <p14:creationId xmlns:p14="http://schemas.microsoft.com/office/powerpoint/2010/main" val="2848151579"/>
+      </p:ext>
+    </p:extLst>
+  </p:cSld>
+  <p:clrMapOvr>
+    <a:masterClrMapping/>
+  </p:clrMapOvr>
+  <p:timing>
+    <p:tnLst>
+      <p:par>
+        <p:cTn id="1" dur="indefinite" restart="never" nodeType="tmRoot">
+          <p:childTnLst>
+            <p:seq concurrent="1" nextAc="seek">
+              <p:cTn id="2" dur="indefinite" nodeType="mainSeq">
+                <p:childTnLst>
+                  <p:par>
+                    <p:cTn id="3" fill="hold">
+                      <p:stCondLst>
+                        <p:cond delay="indefinite"/>
+                      </p:stCondLst>
+                      <p:childTnLst>
+                        <p:par>
+                          <p:cTn id="4" fill="hold">
+                            <p:stCondLst>
+                              <p:cond delay="0"/>
+                            </p:stCondLst>
+                            <p:childTnLst>
+                              <p:par>
+                                <p:cTn id="5" presetID="10" presetClass="entr" presetSubtype="0" fill="hold" grpId="0" nodeType="clickEffect">
+                                  <p:stCondLst>
+                                    <p:cond delay="0"/>
+                                  </p:stCondLst>
+                                  <p:childTnLst>
+                                    <p:set>
+                                      <p:cBhvr>
+                                        <p:cTn id="6" dur="1" fill="hold">
+                                          <p:stCondLst>
+                                            <p:cond delay="0"/>
+                                          </p:stCondLst>
+                                        </p:cTn>
+                                        <p:tgtEl>
+                                          <p:spTgt spid="3">
+                                            <p:txEl>
+                                              <p:pRg st="0" end="0"/>
+                                            </p:txEl>
+                                          </p:spTgt>
+                                        </p:tgtEl>
+                                        <p:attrNameLst>
+                                          <p:attrName>style.visibility</p:attrName>
+                                        </p:attrNameLst>
+                                      </p:cBhvr>
+                                      <p:to>
+                                        <p:strVal val="visible"/>
+                                      </p:to>
+                                    </p:set>
+                                    <p:animEffect transition="in" filter="fade">
+                                      <p:cBhvr>
+                                        <p:cTn id="7" dur="500"/>
+                                        <p:tgtEl>
+                                          <p:spTgt spid="3">
+                                            <p:txEl>
+                                              <p:pRg st="0" end="0"/>
+                                            </p:txEl>
+                                          </p:spTgt>
+                                        </p:tgtEl>
+                                      </p:cBhvr>
+                                    </p:animEffect>
+                                  </p:childTnLst>
+                                </p:cTn>
+                              </p:par>
+                            </p:childTnLst>
+                          </p:cTn>
+                        </p:par>
+                      </p:childTnLst>
+                    </p:cTn>
+                  </p:par>
+                  <p:par>
+                    <p:cTn id="8" fill="hold">
+                      <p:stCondLst>
+                        <p:cond delay="indefinite"/>
+                      </p:stCondLst>
+                      <p:childTnLst>
+                        <p:par>
+                          <p:cTn id="9" fill="hold">
+                            <p:stCondLst>
+                              <p:cond delay="0"/>
+                            </p:stCondLst>
+                            <p:childTnLst>
+                              <p:par>
+                                <p:cTn id="10" presetID="10" presetClass="entr" presetSubtype="0" fill="hold" grpId="0" nodeType="clickEffect">
+                                  <p:stCondLst>
+                                    <p:cond delay="0"/>
+                                  </p:stCondLst>
+                                  <p:childTnLst>
+                                    <p:set>
+                                      <p:cBhvr>
+                                        <p:cTn id="11" dur="1" fill="hold">
+                                          <p:stCondLst>
+                                            <p:cond delay="0"/>
+                                          </p:stCondLst>
+                                        </p:cTn>
+                                        <p:tgtEl>
+                                          <p:spTgt spid="3">
+                                            <p:txEl>
+                                              <p:pRg st="1" end="1"/>
+                                            </p:txEl>
+                                          </p:spTgt>
+                                        </p:tgtEl>
+                                        <p:attrNameLst>
+                                          <p:attrName>style.visibility</p:attrName>
+                                        </p:attrNameLst>
+                                      </p:cBhvr>
+                                      <p:to>
+                                        <p:strVal val="visible"/>
+                                      </p:to>
+                                    </p:set>
+                                    <p:animEffect transition="in" filter="fade">
+                                      <p:cBhvr>
+                                        <p:cTn id="12" dur="500"/>
+                                        <p:tgtEl>
+                                          <p:spTgt spid="3">
+                                            <p:txEl>
+                                              <p:pRg st="1" end="1"/>
+                                            </p:txEl>
+                                          </p:spTgt>
+                                        </p:tgtEl>
+                                      </p:cBhvr>
+                                    </p:animEffect>
+                                  </p:childTnLst>
+                                </p:cTn>
+                              </p:par>
+                            </p:childTnLst>
+                          </p:cTn>
+                        </p:par>
+                      </p:childTnLst>
+                    </p:cTn>
+                  </p:par>
+                  <p:par>
+                    <p:cTn id="13" fill="hold">
+                      <p:stCondLst>
+                        <p:cond delay="indefinite"/>
+                      </p:stCondLst>
+                      <p:childTnLst>
+                        <p:par>
+                          <p:cTn id="14" fill="hold">
+                            <p:stCondLst>
+                              <p:cond delay="0"/>
+                            </p:stCondLst>
+                            <p:childTnLst>
+                              <p:par>
+                                <p:cTn id="15" presetID="10" presetClass="entr" presetSubtype="0" fill="hold" grpId="0" nodeType="clickEffect">
+                                  <p:stCondLst>
+                                    <p:cond delay="0"/>
+                                  </p:stCondLst>
+                                  <p:childTnLst>
+                                    <p:set>
+                                      <p:cBhvr>
+                                        <p:cTn id="16" dur="1" fill="hold">
+                                          <p:stCondLst>
+                                            <p:cond delay="0"/>
+                                          </p:stCondLst>
+                                        </p:cTn>
+                                        <p:tgtEl>
+                                          <p:spTgt spid="3">
+                                            <p:txEl>
+                                              <p:pRg st="2" end="2"/>
+                                            </p:txEl>
+                                          </p:spTgt>
+                                        </p:tgtEl>
+                                        <p:attrNameLst>
+                                          <p:attrName>style.visibility</p:attrName>
+                                        </p:attrNameLst>
+                                      </p:cBhvr>
+                                      <p:to>
+                                        <p:strVal val="visible"/>
+                                      </p:to>
+                                    </p:set>
+                                    <p:animEffect transition="in" filter="fade">
+                                      <p:cBhvr>
+                                        <p:cTn id="17" dur="500"/>
+                                        <p:tgtEl>
+                                          <p:spTgt spid="3">
+                                            <p:txEl>
+                                              <p:pRg st="2" end="2"/>
+                                            </p:txEl>
+                                          </p:spTgt>
+                                        </p:tgtEl>
+                                      </p:cBhvr>
+                                    </p:animEffect>
+                                  </p:childTnLst>
+                                </p:cTn>
+                              </p:par>
+                            </p:childTnLst>
+                          </p:cTn>
+                        </p:par>
+                      </p:childTnLst>
+                    </p:cTn>
+                  </p:par>
+                  <p:par>
+                    <p:cTn id="18" fill="hold">
+                      <p:stCondLst>
+                        <p:cond delay="indefinite"/>
+                      </p:stCondLst>
+                      <p:childTnLst>
+                        <p:par>
+                          <p:cTn id="19" fill="hold">
+                            <p:stCondLst>
+                              <p:cond delay="0"/>
+                            </p:stCondLst>
+                            <p:childTnLst>
+                              <p:par>
+                                <p:cTn id="20" presetID="10" presetClass="entr" presetSubtype="0" fill="hold" grpId="0" nodeType="clickEffect">
+                                  <p:stCondLst>
+                                    <p:cond delay="0"/>
+                                  </p:stCondLst>
+                                  <p:childTnLst>
+                                    <p:set>
+                                      <p:cBhvr>
+                                        <p:cTn id="21" dur="1" fill="hold">
+                                          <p:stCondLst>
+                                            <p:cond delay="0"/>
+                                          </p:stCondLst>
+                                        </p:cTn>
+                                        <p:tgtEl>
+                                          <p:spTgt spid="3">
+                                            <p:txEl>
+                                              <p:pRg st="3" end="3"/>
+                                            </p:txEl>
+                                          </p:spTgt>
+                                        </p:tgtEl>
+                                        <p:attrNameLst>
+                                          <p:attrName>style.visibility</p:attrName>
+                                        </p:attrNameLst>
+                                      </p:cBhvr>
+                                      <p:to>
+                                        <p:strVal val="visible"/>
+                                      </p:to>
+                                    </p:set>
+                                    <p:animEffect transition="in" filter="fade">
+                                      <p:cBhvr>
+                                        <p:cTn id="22" dur="500"/>
+                                        <p:tgtEl>
+                                          <p:spTgt spid="3">
+                                            <p:txEl>
+                                              <p:pRg st="3" end="3"/>
+                                            </p:txEl>
+                                          </p:spTgt>
+                                        </p:tgtEl>
+                                      </p:cBhvr>
+                                    </p:animEffect>
+                                  </p:childTnLst>
+                                </p:cTn>
+                              </p:par>
+                            </p:childTnLst>
+                          </p:cTn>
+                        </p:par>
+                      </p:childTnLst>
+                    </p:cTn>
+                  </p:par>
+                </p:childTnLst>
+              </p:cTn>
+              <p:prevCondLst>
+                <p:cond evt="onPrev" delay="0">
+                  <p:tgtEl>
+                    <p:sldTgt/>
+                  </p:tgtEl>
+                </p:cond>
+              </p:prevCondLst>
+              <p:nextCondLst>
+                <p:cond evt="onNext" delay="0">
+                  <p:tgtEl>
+                    <p:sldTgt/>
+                  </p:tgtEl>
+                </p:cond>
+              </p:nextCondLst>
+            </p:seq>
+          </p:childTnLst>
+        </p:cTn>
+      </p:par>
+    </p:tnLst>
+    <p:bldLst>
+      <p:bldP spid="3" grpId="0" build="p"/>
+    </p:bldLst>
+  </p:timing>
+</p:sld>
+</file>
+
+<file path=ppt/slides/slide15.xml><?xml version="1.0" encoding="utf-8"?>
+<p:sld xmlns:a="http://schemas.openxmlformats.org/drawingml/2006/main" xmlns:r="http://schemas.openxmlformats.org/officeDocument/2006/relationships" xmlns:p="http://schemas.openxmlformats.org/presentationml/2006/main">
+  <p:cSld>
+    <p:spTree>
+      <p:nvGrpSpPr>
+        <p:cNvPr id="1" name=""/>
+        <p:cNvGrpSpPr/>
+        <p:nvPr/>
+      </p:nvGrpSpPr>
+      <p:grpSpPr>
+        <a:xfrm>
+          <a:off x="0" y="0"/>
+          <a:ext cx="0" cy="0"/>
+          <a:chOff x="0" y="0"/>
+          <a:chExt cx="0" cy="0"/>
+        </a:xfrm>
+      </p:grpSpPr>
+      <p:sp>
+        <p:nvSpPr>
+          <p:cNvPr id="2" name="Título 1"/>
+          <p:cNvSpPr>
+            <a:spLocks noGrp="1"/>
+          </p:cNvSpPr>
+          <p:nvPr>
+            <p:ph type="title"/>
+          </p:nvPr>
+        </p:nvSpPr>
+        <p:spPr/>
+        <p:txBody>
+          <a:bodyPr>
+            <a:normAutofit fontScale="90000"/>
+          </a:bodyPr>
+          <a:lstStyle/>
+          <a:p>
+            <a:r>
+              <a:rPr lang="pt-BR" dirty="0" smtClean="0"/>
+              <a:t>Fundamentação Teórica</a:t>
+            </a:r>
+            <a:br>
+              <a:rPr lang="pt-BR" dirty="0" smtClean="0"/>
+            </a:br>
+            <a:r>
+              <a:rPr lang="pt-BR" sz="3100" dirty="0" smtClean="0"/>
+              <a:t>Motores de Gabaritos</a:t>
+            </a:r>
+            <a:endParaRPr lang="pt-BR" dirty="0"/>
+          </a:p>
+        </p:txBody>
+      </p:sp>
+      <p:sp>
+        <p:nvSpPr>
+          <p:cNvPr id="5" name="CaixaDeTexto 4"/>
+          <p:cNvSpPr txBox="1"/>
+          <p:nvPr/>
+        </p:nvSpPr>
+        <p:spPr>
+          <a:xfrm>
+            <a:off x="467544" y="2622313"/>
+            <a:ext cx="8280920" cy="2800767"/>
+          </a:xfrm>
+          <a:prstGeom prst="rect">
+            <a:avLst/>
+          </a:prstGeom>
+          <a:noFill/>
+        </p:spPr>
+        <p:txBody>
+          <a:bodyPr wrap="square" rtlCol="0">
+            <a:spAutoFit/>
+          </a:bodyPr>
+          <a:lstStyle/>
+          <a:p>
+            <a:r>
+              <a:rPr lang="pt-BR" sz="1600" b="1" dirty="0">
+                <a:latin typeface="Consolas" panose="020B0609020204030204" pitchFamily="49" charset="0"/>
+              </a:rPr>
+              <a:t>&lt;#</a:t>
+            </a:r>
+            <a:r>
+              <a:rPr lang="pt-BR" sz="1600" b="1" dirty="0" err="1">
+                <a:latin typeface="Consolas" panose="020B0609020204030204" pitchFamily="49" charset="0"/>
+              </a:rPr>
+              <a:t>list</a:t>
+            </a:r>
+            <a:r>
+              <a:rPr lang="pt-BR" sz="1600" b="1" dirty="0">
+                <a:latin typeface="Consolas" panose="020B0609020204030204" pitchFamily="49" charset="0"/>
+              </a:rPr>
+              <a:t> </a:t>
+            </a:r>
+            <a:r>
+              <a:rPr lang="pt-BR" sz="1600" b="1" dirty="0" err="1">
+                <a:latin typeface="Consolas" panose="020B0609020204030204" pitchFamily="49" charset="0"/>
+              </a:rPr>
+              <a:t>graficos</a:t>
+            </a:r>
+            <a:r>
+              <a:rPr lang="pt-BR" sz="1600" b="1" dirty="0">
+                <a:latin typeface="Consolas" panose="020B0609020204030204" pitchFamily="49" charset="0"/>
+              </a:rPr>
+              <a:t> as </a:t>
+            </a:r>
+            <a:r>
+              <a:rPr lang="pt-BR" sz="1600" b="1" dirty="0" err="1">
+                <a:latin typeface="Consolas" panose="020B0609020204030204" pitchFamily="49" charset="0"/>
+              </a:rPr>
+              <a:t>grafico</a:t>
+            </a:r>
+            <a:r>
+              <a:rPr lang="pt-BR" sz="1600" b="1" dirty="0">
+                <a:latin typeface="Consolas" panose="020B0609020204030204" pitchFamily="49" charset="0"/>
+              </a:rPr>
+              <a:t>&gt;            </a:t>
+            </a:r>
+            <a:endParaRPr lang="pt-BR" sz="1600" b="1" dirty="0" smtClean="0">
+              <a:latin typeface="Consolas" panose="020B0609020204030204" pitchFamily="49" charset="0"/>
+            </a:endParaRPr>
+          </a:p>
+          <a:p>
+            <a:r>
+              <a:rPr lang="pt-BR" sz="1600" dirty="0" smtClean="0">
+                <a:latin typeface="Consolas" panose="020B0609020204030204" pitchFamily="49" charset="0"/>
+              </a:rPr>
+              <a:t>&lt;</a:t>
+            </a:r>
+            <a:r>
+              <a:rPr lang="pt-BR" sz="1600" dirty="0" err="1">
+                <a:latin typeface="Consolas" panose="020B0609020204030204" pitchFamily="49" charset="0"/>
+              </a:rPr>
+              <a:t>div</a:t>
+            </a:r>
+            <a:r>
+              <a:rPr lang="pt-BR" sz="1600" dirty="0">
+                <a:latin typeface="Consolas" panose="020B0609020204030204" pitchFamily="49" charset="0"/>
+              </a:rPr>
+              <a:t> id="</a:t>
+            </a:r>
+            <a:r>
+              <a:rPr lang="pt-BR" sz="1600" dirty="0" err="1">
+                <a:latin typeface="Consolas" panose="020B0609020204030204" pitchFamily="49" charset="0"/>
+              </a:rPr>
+              <a:t>grafico</a:t>
+            </a:r>
+            <a:r>
+              <a:rPr lang="pt-BR" sz="1600" b="1" dirty="0">
+                <a:latin typeface="Consolas" panose="020B0609020204030204" pitchFamily="49" charset="0"/>
+              </a:rPr>
+              <a:t>${</a:t>
+            </a:r>
+            <a:r>
+              <a:rPr lang="pt-BR" sz="1600" b="1" dirty="0" err="1">
+                <a:latin typeface="Consolas" panose="020B0609020204030204" pitchFamily="49" charset="0"/>
+              </a:rPr>
+              <a:t>grafico_index</a:t>
+            </a:r>
+            <a:r>
+              <a:rPr lang="pt-BR" sz="1600" b="1" dirty="0">
+                <a:latin typeface="Consolas" panose="020B0609020204030204" pitchFamily="49" charset="0"/>
+              </a:rPr>
+              <a:t> +1}</a:t>
+            </a:r>
+            <a:r>
+              <a:rPr lang="pt-BR" sz="1600" dirty="0">
+                <a:latin typeface="Consolas" panose="020B0609020204030204" pitchFamily="49" charset="0"/>
+              </a:rPr>
+              <a:t>"</a:t>
+            </a:r>
+            <a:r>
+              <a:rPr lang="pt-BR" sz="1600" b="1" dirty="0">
+                <a:latin typeface="Consolas" panose="020B0609020204030204" pitchFamily="49" charset="0"/>
+              </a:rPr>
+              <a:t> </a:t>
+            </a:r>
+            <a:r>
+              <a:rPr lang="pt-BR" sz="1600" dirty="0" err="1">
+                <a:latin typeface="Consolas" panose="020B0609020204030204" pitchFamily="49" charset="0"/>
+              </a:rPr>
+              <a:t>class</a:t>
+            </a:r>
+            <a:r>
+              <a:rPr lang="pt-BR" sz="1600" dirty="0">
+                <a:latin typeface="Consolas" panose="020B0609020204030204" pitchFamily="49" charset="0"/>
+              </a:rPr>
+              <a:t>='col-xs-12 col-md-12 col-lg-4</a:t>
+            </a:r>
+            <a:r>
+              <a:rPr lang="pt-BR" sz="1600" dirty="0" smtClean="0">
+                <a:latin typeface="Consolas" panose="020B0609020204030204" pitchFamily="49" charset="0"/>
+              </a:rPr>
+              <a:t>'&gt;</a:t>
+            </a:r>
+          </a:p>
+          <a:p>
+            <a:r>
+              <a:rPr lang="pt-BR" sz="1600" dirty="0">
+                <a:latin typeface="Consolas" panose="020B0609020204030204" pitchFamily="49" charset="0"/>
+              </a:rPr>
+              <a:t> </a:t>
+            </a:r>
+            <a:r>
+              <a:rPr lang="pt-BR" sz="1600" dirty="0" smtClean="0">
+                <a:latin typeface="Consolas" panose="020B0609020204030204" pitchFamily="49" charset="0"/>
+              </a:rPr>
+              <a:t>     &lt;</a:t>
+            </a:r>
+            <a:r>
+              <a:rPr lang="pt-BR" sz="1600" dirty="0" err="1">
+                <a:latin typeface="Consolas" panose="020B0609020204030204" pitchFamily="49" charset="0"/>
+              </a:rPr>
+              <a:t>strong</a:t>
+            </a:r>
+            <a:r>
+              <a:rPr lang="pt-BR" sz="1600" dirty="0">
+                <a:latin typeface="Consolas" panose="020B0609020204030204" pitchFamily="49" charset="0"/>
+              </a:rPr>
+              <a:t>&gt;</a:t>
+            </a:r>
+            <a:r>
+              <a:rPr lang="pt-BR" sz="1600" b="1" dirty="0">
+                <a:latin typeface="Consolas" panose="020B0609020204030204" pitchFamily="49" charset="0"/>
+              </a:rPr>
+              <a:t>${</a:t>
+            </a:r>
+            <a:r>
+              <a:rPr lang="pt-BR" sz="1600" b="1" dirty="0" err="1">
+                <a:latin typeface="Consolas" panose="020B0609020204030204" pitchFamily="49" charset="0"/>
+              </a:rPr>
+              <a:t>grafico.nome</a:t>
+            </a:r>
+            <a:r>
+              <a:rPr lang="pt-BR" sz="1600" b="1" dirty="0">
+                <a:latin typeface="Consolas" panose="020B0609020204030204" pitchFamily="49" charset="0"/>
+              </a:rPr>
+              <a:t>}</a:t>
+            </a:r>
+            <a:r>
+              <a:rPr lang="pt-BR" sz="1600" dirty="0">
+                <a:latin typeface="Consolas" panose="020B0609020204030204" pitchFamily="49" charset="0"/>
+              </a:rPr>
+              <a:t>&lt;/</a:t>
+            </a:r>
+            <a:r>
+              <a:rPr lang="pt-BR" sz="1600" dirty="0" err="1">
+                <a:latin typeface="Consolas" panose="020B0609020204030204" pitchFamily="49" charset="0"/>
+              </a:rPr>
+              <a:t>strong</a:t>
+            </a:r>
+            <a:r>
+              <a:rPr lang="pt-BR" sz="1600" dirty="0" smtClean="0">
+                <a:latin typeface="Consolas" panose="020B0609020204030204" pitchFamily="49" charset="0"/>
+              </a:rPr>
+              <a:t>&gt;</a:t>
+            </a:r>
+          </a:p>
+          <a:p>
+            <a:r>
+              <a:rPr lang="pt-BR" sz="1600" dirty="0" smtClean="0">
+                <a:latin typeface="Consolas" panose="020B0609020204030204" pitchFamily="49" charset="0"/>
+              </a:rPr>
+              <a:t>      &lt;</a:t>
+            </a:r>
+            <a:r>
+              <a:rPr lang="pt-BR" sz="1600" dirty="0" err="1">
+                <a:latin typeface="Consolas" panose="020B0609020204030204" pitchFamily="49" charset="0"/>
+              </a:rPr>
+              <a:t>span</a:t>
+            </a:r>
+            <a:r>
+              <a:rPr lang="pt-BR" sz="1600" dirty="0">
+                <a:latin typeface="Consolas" panose="020B0609020204030204" pitchFamily="49" charset="0"/>
+              </a:rPr>
+              <a:t> </a:t>
+            </a:r>
+            <a:r>
+              <a:rPr lang="pt-BR" sz="1600" dirty="0" err="1">
+                <a:latin typeface="Consolas" panose="020B0609020204030204" pitchFamily="49" charset="0"/>
+              </a:rPr>
+              <a:t>class</a:t>
+            </a:r>
+            <a:r>
+              <a:rPr lang="pt-BR" sz="1600" dirty="0">
+                <a:latin typeface="Consolas" panose="020B0609020204030204" pitchFamily="49" charset="0"/>
+              </a:rPr>
+              <a:t>="reset" </a:t>
+            </a:r>
+            <a:r>
+              <a:rPr lang="pt-BR" sz="1600" dirty="0" err="1">
+                <a:latin typeface="Consolas" panose="020B0609020204030204" pitchFamily="49" charset="0"/>
+              </a:rPr>
+              <a:t>style</a:t>
+            </a:r>
+            <a:r>
+              <a:rPr lang="pt-BR" sz="1600" dirty="0">
+                <a:latin typeface="Consolas" panose="020B0609020204030204" pitchFamily="49" charset="0"/>
+              </a:rPr>
+              <a:t>="display: </a:t>
+            </a:r>
+            <a:r>
+              <a:rPr lang="pt-BR" sz="1600" dirty="0" err="1">
+                <a:latin typeface="Consolas" panose="020B0609020204030204" pitchFamily="49" charset="0"/>
+              </a:rPr>
+              <a:t>none</a:t>
+            </a:r>
+            <a:r>
+              <a:rPr lang="pt-BR" sz="1600" dirty="0">
+                <a:latin typeface="Consolas" panose="020B0609020204030204" pitchFamily="49" charset="0"/>
+              </a:rPr>
+              <a:t>;"&gt;</a:t>
+            </a:r>
+            <a:r>
+              <a:rPr lang="pt-BR" sz="1600" dirty="0" err="1">
+                <a:latin typeface="Consolas" panose="020B0609020204030204" pitchFamily="49" charset="0"/>
+              </a:rPr>
+              <a:t>Selected</a:t>
+            </a:r>
+            <a:r>
+              <a:rPr lang="pt-BR" sz="1600" dirty="0" smtClean="0">
+                <a:latin typeface="Consolas" panose="020B0609020204030204" pitchFamily="49" charset="0"/>
+              </a:rPr>
+              <a:t>:&lt;</a:t>
+            </a:r>
+            <a:r>
+              <a:rPr lang="pt-BR" sz="1600" dirty="0" err="1">
+                <a:latin typeface="Consolas" panose="020B0609020204030204" pitchFamily="49" charset="0"/>
+              </a:rPr>
+              <a:t>span</a:t>
+            </a:r>
+            <a:r>
+              <a:rPr lang="pt-BR" sz="1600" dirty="0">
+                <a:latin typeface="Consolas" panose="020B0609020204030204" pitchFamily="49" charset="0"/>
+              </a:rPr>
+              <a:t> </a:t>
+            </a:r>
+            <a:r>
+              <a:rPr lang="pt-BR" sz="1600" dirty="0" err="1">
+                <a:latin typeface="Consolas" panose="020B0609020204030204" pitchFamily="49" charset="0"/>
+              </a:rPr>
+              <a:t>class</a:t>
+            </a:r>
+            <a:r>
+              <a:rPr lang="pt-BR" sz="1600" dirty="0">
+                <a:latin typeface="Consolas" panose="020B0609020204030204" pitchFamily="49" charset="0"/>
+              </a:rPr>
+              <a:t>="</a:t>
+            </a:r>
+            <a:r>
+              <a:rPr lang="pt-BR" sz="1600" dirty="0" err="1">
+                <a:latin typeface="Consolas" panose="020B0609020204030204" pitchFamily="49" charset="0"/>
+              </a:rPr>
+              <a:t>filter</a:t>
+            </a:r>
+            <a:r>
+              <a:rPr lang="pt-BR" sz="1600" dirty="0">
+                <a:latin typeface="Consolas" panose="020B0609020204030204" pitchFamily="49" charset="0"/>
+              </a:rPr>
+              <a:t>"&gt;&lt;/</a:t>
+            </a:r>
+            <a:r>
+              <a:rPr lang="pt-BR" sz="1600" dirty="0" err="1">
+                <a:latin typeface="Consolas" panose="020B0609020204030204" pitchFamily="49" charset="0"/>
+              </a:rPr>
+              <a:t>span</a:t>
+            </a:r>
+            <a:r>
+              <a:rPr lang="pt-BR" sz="1600" dirty="0">
+                <a:latin typeface="Consolas" panose="020B0609020204030204" pitchFamily="49" charset="0"/>
+              </a:rPr>
+              <a:t>&gt;&lt;/</a:t>
+            </a:r>
+            <a:r>
+              <a:rPr lang="pt-BR" sz="1600" dirty="0" err="1">
+                <a:latin typeface="Consolas" panose="020B0609020204030204" pitchFamily="49" charset="0"/>
+              </a:rPr>
+              <a:t>span</a:t>
+            </a:r>
+            <a:r>
+              <a:rPr lang="pt-BR" sz="1600" dirty="0">
+                <a:latin typeface="Consolas" panose="020B0609020204030204" pitchFamily="49" charset="0"/>
+              </a:rPr>
+              <a:t>&gt;                </a:t>
+            </a:r>
+            <a:endParaRPr lang="pt-BR" sz="1600" dirty="0" smtClean="0">
+              <a:latin typeface="Consolas" panose="020B0609020204030204" pitchFamily="49" charset="0"/>
+            </a:endParaRPr>
+          </a:p>
+          <a:p>
+            <a:r>
+              <a:rPr lang="pt-BR" sz="1600" dirty="0" smtClean="0">
+                <a:latin typeface="Consolas" panose="020B0609020204030204" pitchFamily="49" charset="0"/>
+              </a:rPr>
+              <a:t>      &lt;</a:t>
+            </a:r>
+            <a:r>
+              <a:rPr lang="pt-BR" sz="1600" dirty="0">
+                <a:latin typeface="Consolas" panose="020B0609020204030204" pitchFamily="49" charset="0"/>
+              </a:rPr>
+              <a:t>a </a:t>
+            </a:r>
+            <a:r>
+              <a:rPr lang="pt-BR" sz="1600" dirty="0" err="1">
+                <a:latin typeface="Consolas" panose="020B0609020204030204" pitchFamily="49" charset="0"/>
+              </a:rPr>
+              <a:t>class</a:t>
+            </a:r>
+            <a:r>
+              <a:rPr lang="pt-BR" sz="1600" dirty="0">
+                <a:latin typeface="Consolas" panose="020B0609020204030204" pitchFamily="49" charset="0"/>
+              </a:rPr>
+              <a:t>="reset" </a:t>
+            </a:r>
+            <a:r>
+              <a:rPr lang="pt-BR" sz="1600" dirty="0" err="1">
+                <a:latin typeface="Consolas" panose="020B0609020204030204" pitchFamily="49" charset="0"/>
+              </a:rPr>
+              <a:t>href</a:t>
+            </a:r>
+            <a:r>
+              <a:rPr lang="pt-BR" sz="1600" dirty="0">
+                <a:latin typeface="Consolas" panose="020B0609020204030204" pitchFamily="49" charset="0"/>
+              </a:rPr>
+              <a:t>="</a:t>
+            </a:r>
+            <a:r>
+              <a:rPr lang="pt-BR" sz="1600" dirty="0" err="1">
+                <a:latin typeface="Consolas" panose="020B0609020204030204" pitchFamily="49" charset="0"/>
+              </a:rPr>
+              <a:t>javascript:grafico</a:t>
+            </a:r>
+            <a:r>
+              <a:rPr lang="pt-BR" sz="1600" b="1" dirty="0">
+                <a:latin typeface="Consolas" panose="020B0609020204030204" pitchFamily="49" charset="0"/>
+              </a:rPr>
+              <a:t>${</a:t>
+            </a:r>
+            <a:r>
+              <a:rPr lang="pt-BR" sz="1600" b="1" dirty="0" err="1">
+                <a:latin typeface="Consolas" panose="020B0609020204030204" pitchFamily="49" charset="0"/>
+              </a:rPr>
+              <a:t>grafico_index</a:t>
+            </a:r>
+            <a:r>
+              <a:rPr lang="pt-BR" sz="1600" b="1" dirty="0">
+                <a:latin typeface="Consolas" panose="020B0609020204030204" pitchFamily="49" charset="0"/>
+              </a:rPr>
+              <a:t> </a:t>
+            </a:r>
+            <a:r>
+              <a:rPr lang="pt-BR" sz="1600" b="1" dirty="0" smtClean="0">
+                <a:latin typeface="Consolas" panose="020B0609020204030204" pitchFamily="49" charset="0"/>
+              </a:rPr>
+              <a:t>+1}</a:t>
+            </a:r>
+            <a:r>
+              <a:rPr lang="pt-BR" sz="1600" dirty="0" smtClean="0">
+                <a:latin typeface="Consolas" panose="020B0609020204030204" pitchFamily="49" charset="0"/>
+              </a:rPr>
+              <a:t>.</a:t>
+            </a:r>
+            <a:r>
+              <a:rPr lang="pt-BR" sz="1600" dirty="0" err="1">
+                <a:latin typeface="Consolas" panose="020B0609020204030204" pitchFamily="49" charset="0"/>
+              </a:rPr>
+              <a:t>filterAll</a:t>
+            </a:r>
+            <a:r>
+              <a:rPr lang="pt-BR" sz="1600" dirty="0">
+                <a:latin typeface="Consolas" panose="020B0609020204030204" pitchFamily="49" charset="0"/>
+              </a:rPr>
+              <a:t>();</a:t>
+            </a:r>
+            <a:r>
+              <a:rPr lang="pt-BR" sz="1600" dirty="0" err="1">
+                <a:latin typeface="Consolas" panose="020B0609020204030204" pitchFamily="49" charset="0"/>
+              </a:rPr>
+              <a:t>dc.redrawAll</a:t>
+            </a:r>
+            <a:r>
+              <a:rPr lang="pt-BR" sz="1600" dirty="0">
+                <a:latin typeface="Consolas" panose="020B0609020204030204" pitchFamily="49" charset="0"/>
+              </a:rPr>
+              <a:t>();" </a:t>
+            </a:r>
+            <a:r>
+              <a:rPr lang="pt-BR" sz="1600" dirty="0" smtClean="0">
+                <a:latin typeface="Consolas" panose="020B0609020204030204" pitchFamily="49" charset="0"/>
+              </a:rPr>
+              <a:t> </a:t>
+            </a:r>
+            <a:r>
+              <a:rPr lang="pt-BR" sz="1600" dirty="0" err="1" smtClean="0">
+                <a:latin typeface="Consolas" panose="020B0609020204030204" pitchFamily="49" charset="0"/>
+              </a:rPr>
+              <a:t>style</a:t>
+            </a:r>
+            <a:r>
+              <a:rPr lang="pt-BR" sz="1600" dirty="0">
+                <a:latin typeface="Consolas" panose="020B0609020204030204" pitchFamily="49" charset="0"/>
+              </a:rPr>
+              <a:t>="display: </a:t>
+            </a:r>
+            <a:r>
+              <a:rPr lang="pt-BR" sz="1600" dirty="0" err="1">
+                <a:latin typeface="Consolas" panose="020B0609020204030204" pitchFamily="49" charset="0"/>
+              </a:rPr>
+              <a:t>none</a:t>
+            </a:r>
+            <a:r>
+              <a:rPr lang="pt-BR" sz="1600" dirty="0">
+                <a:latin typeface="Consolas" panose="020B0609020204030204" pitchFamily="49" charset="0"/>
+              </a:rPr>
+              <a:t>;"&gt;reset&lt;/a</a:t>
+            </a:r>
+            <a:r>
+              <a:rPr lang="pt-BR" sz="1600" dirty="0" smtClean="0">
+                <a:latin typeface="Consolas" panose="020B0609020204030204" pitchFamily="49" charset="0"/>
+              </a:rPr>
+              <a:t>&gt;</a:t>
+            </a:r>
+          </a:p>
+          <a:p>
+            <a:r>
+              <a:rPr lang="pt-BR" sz="1600" dirty="0">
+                <a:latin typeface="Consolas" panose="020B0609020204030204" pitchFamily="49" charset="0"/>
+              </a:rPr>
+              <a:t> </a:t>
+            </a:r>
+            <a:r>
+              <a:rPr lang="pt-BR" sz="1600" dirty="0" smtClean="0">
+                <a:latin typeface="Consolas" panose="020B0609020204030204" pitchFamily="49" charset="0"/>
+              </a:rPr>
+              <a:t>     &lt;</a:t>
+            </a:r>
+            <a:r>
+              <a:rPr lang="pt-BR" sz="1600" dirty="0" err="1">
+                <a:latin typeface="Consolas" panose="020B0609020204030204" pitchFamily="49" charset="0"/>
+              </a:rPr>
+              <a:t>div</a:t>
+            </a:r>
+            <a:r>
+              <a:rPr lang="pt-BR" sz="1600" dirty="0">
+                <a:latin typeface="Consolas" panose="020B0609020204030204" pitchFamily="49" charset="0"/>
+              </a:rPr>
+              <a:t> </a:t>
+            </a:r>
+            <a:r>
+              <a:rPr lang="pt-BR" sz="1600" dirty="0" err="1">
+                <a:latin typeface="Consolas" panose="020B0609020204030204" pitchFamily="49" charset="0"/>
+              </a:rPr>
+              <a:t>class</a:t>
+            </a:r>
+            <a:r>
+              <a:rPr lang="pt-BR" sz="1600" dirty="0">
+                <a:latin typeface="Consolas" panose="020B0609020204030204" pitchFamily="49" charset="0"/>
+              </a:rPr>
+              <a:t>="</a:t>
+            </a:r>
+            <a:r>
+              <a:rPr lang="pt-BR" sz="1600" dirty="0" err="1">
+                <a:latin typeface="Consolas" panose="020B0609020204030204" pitchFamily="49" charset="0"/>
+              </a:rPr>
+              <a:t>clearfix</a:t>
+            </a:r>
+            <a:r>
+              <a:rPr lang="pt-BR" sz="1600" dirty="0">
+                <a:latin typeface="Consolas" panose="020B0609020204030204" pitchFamily="49" charset="0"/>
+              </a:rPr>
+              <a:t>"&gt;&lt;/</a:t>
+            </a:r>
+            <a:r>
+              <a:rPr lang="pt-BR" sz="1600" dirty="0" err="1">
+                <a:latin typeface="Consolas" panose="020B0609020204030204" pitchFamily="49" charset="0"/>
+              </a:rPr>
+              <a:t>div</a:t>
+            </a:r>
+            <a:r>
+              <a:rPr lang="pt-BR" sz="1600" dirty="0" smtClean="0">
+                <a:latin typeface="Consolas" panose="020B0609020204030204" pitchFamily="49" charset="0"/>
+              </a:rPr>
+              <a:t>&gt;</a:t>
+            </a:r>
+          </a:p>
+          <a:p>
+            <a:r>
+              <a:rPr lang="pt-BR" sz="1600" dirty="0" smtClean="0">
+                <a:latin typeface="Consolas" panose="020B0609020204030204" pitchFamily="49" charset="0"/>
+              </a:rPr>
+              <a:t>&lt;/</a:t>
+            </a:r>
+            <a:r>
+              <a:rPr lang="pt-BR" sz="1600" dirty="0" err="1">
+                <a:latin typeface="Consolas" panose="020B0609020204030204" pitchFamily="49" charset="0"/>
+              </a:rPr>
+              <a:t>div</a:t>
+            </a:r>
+            <a:r>
+              <a:rPr lang="pt-BR" sz="1600" dirty="0">
+                <a:latin typeface="Consolas" panose="020B0609020204030204" pitchFamily="49" charset="0"/>
+              </a:rPr>
+              <a:t>&gt;        </a:t>
+            </a:r>
+            <a:endParaRPr lang="pt-BR" sz="1600" dirty="0" smtClean="0">
+              <a:latin typeface="Consolas" panose="020B0609020204030204" pitchFamily="49" charset="0"/>
+            </a:endParaRPr>
+          </a:p>
+          <a:p>
+            <a:r>
+              <a:rPr lang="pt-BR" sz="1600" b="1" dirty="0" smtClean="0">
+                <a:latin typeface="Consolas" panose="020B0609020204030204" pitchFamily="49" charset="0"/>
+              </a:rPr>
+              <a:t>&lt;/#</a:t>
+            </a:r>
+            <a:r>
+              <a:rPr lang="pt-BR" sz="1600" b="1" dirty="0" err="1">
+                <a:latin typeface="Consolas" panose="020B0609020204030204" pitchFamily="49" charset="0"/>
+              </a:rPr>
+              <a:t>list</a:t>
+            </a:r>
+            <a:r>
+              <a:rPr lang="pt-BR" sz="1600" b="1" dirty="0">
+                <a:latin typeface="Consolas" panose="020B0609020204030204" pitchFamily="49" charset="0"/>
+              </a:rPr>
+              <a:t>&gt;</a:t>
+            </a:r>
+          </a:p>
+        </p:txBody>
+      </p:sp>
+      <p:sp>
+        <p:nvSpPr>
+          <p:cNvPr id="6" name="CaixaDeTexto 5"/>
+          <p:cNvSpPr txBox="1"/>
+          <p:nvPr/>
+        </p:nvSpPr>
+        <p:spPr>
+          <a:xfrm>
+            <a:off x="539552" y="1700808"/>
+            <a:ext cx="3322961" cy="461665"/>
+          </a:xfrm>
+          <a:prstGeom prst="rect">
+            <a:avLst/>
+          </a:prstGeom>
+          <a:noFill/>
+        </p:spPr>
+        <p:txBody>
+          <a:bodyPr wrap="none" rtlCol="0">
+            <a:spAutoFit/>
+          </a:bodyPr>
+          <a:lstStyle/>
+          <a:p>
+            <a:r>
+              <a:rPr lang="pt-BR" sz="2400" b="1" dirty="0" smtClean="0"/>
+              <a:t>Gabarito ou Template</a:t>
+            </a:r>
+            <a:endParaRPr lang="pt-BR" sz="2400" b="1" dirty="0"/>
+          </a:p>
+        </p:txBody>
+      </p:sp>
+    </p:spTree>
+    <p:extLst>
+      <p:ext uri="{BB962C8B-B14F-4D97-AF65-F5344CB8AC3E}">
+        <p14:creationId xmlns:p14="http://schemas.microsoft.com/office/powerpoint/2010/main" val="2899401314"/>
+      </p:ext>
+    </p:extLst>
+  </p:cSld>
+  <p:clrMapOvr>
+    <a:masterClrMapping/>
+  </p:clrMapOvr>
+  <p:timing>
+    <p:tnLst>
+      <p:par>
+        <p:cTn id="1" dur="indefinite" restart="never" nodeType="tmRoot">
+          <p:childTnLst>
+            <p:seq concurrent="1" nextAc="seek">
+              <p:cTn id="2" dur="indefinite" nodeType="mainSeq">
+                <p:childTnLst>
+                  <p:par>
+                    <p:cTn id="3" fill="hold">
+                      <p:stCondLst>
+                        <p:cond delay="indefinite"/>
+                      </p:stCondLst>
+                      <p:childTnLst>
+                        <p:par>
+                          <p:cTn id="4" fill="hold">
+                            <p:stCondLst>
+                              <p:cond delay="0"/>
+                            </p:stCondLst>
+                            <p:childTnLst>
+                              <p:par>
+                                <p:cTn id="5" presetID="2" presetClass="entr" presetSubtype="4" fill="hold" grpId="0" nodeType="clickEffect">
+                                  <p:stCondLst>
+                                    <p:cond delay="0"/>
+                                  </p:stCondLst>
+                                  <p:childTnLst>
+                                    <p:set>
+                                      <p:cBhvr>
+                                        <p:cTn id="6" dur="1" fill="hold">
+                                          <p:stCondLst>
+                                            <p:cond delay="0"/>
+                                          </p:stCondLst>
+                                        </p:cTn>
+                                        <p:tgtEl>
+                                          <p:spTgt spid="5"/>
+                                        </p:tgtEl>
+                                        <p:attrNameLst>
+                                          <p:attrName>style.visibility</p:attrName>
+                                        </p:attrNameLst>
+                                      </p:cBhvr>
+                                      <p:to>
+                                        <p:strVal val="visible"/>
+                                      </p:to>
+                                    </p:set>
+                                    <p:anim calcmode="lin" valueType="num">
+                                      <p:cBhvr additive="base">
+                                        <p:cTn id="7" dur="500" fill="hold"/>
+                                        <p:tgtEl>
+                                          <p:spTgt spid="5"/>
+                                        </p:tgtEl>
+                                        <p:attrNameLst>
+                                          <p:attrName>ppt_x</p:attrName>
+                                        </p:attrNameLst>
+                                      </p:cBhvr>
+                                      <p:tavLst>
+                                        <p:tav tm="0">
+                                          <p:val>
+                                            <p:strVal val="#ppt_x"/>
+                                          </p:val>
+                                        </p:tav>
+                                        <p:tav tm="100000">
+                                          <p:val>
+                                            <p:strVal val="#ppt_x"/>
+                                          </p:val>
+                                        </p:tav>
+                                      </p:tavLst>
+                                    </p:anim>
+                                    <p:anim calcmode="lin" valueType="num">
+                                      <p:cBhvr additive="base">
+                                        <p:cTn id="8" dur="500" fill="hold"/>
+                                        <p:tgtEl>
+                                          <p:spTgt spid="5"/>
+                                        </p:tgtEl>
+                                        <p:attrNameLst>
+                                          <p:attrName>ppt_y</p:attrName>
+                                        </p:attrNameLst>
+                                      </p:cBhvr>
+                                      <p:tavLst>
+                                        <p:tav tm="0">
+                                          <p:val>
+                                            <p:strVal val="1+#ppt_h/2"/>
+                                          </p:val>
+                                        </p:tav>
+                                        <p:tav tm="100000">
+                                          <p:val>
+                                            <p:strVal val="#ppt_y"/>
+                                          </p:val>
+                                        </p:tav>
+                                      </p:tavLst>
+                                    </p:anim>
+                                  </p:childTnLst>
+                                </p:cTn>
+                              </p:par>
+                            </p:childTnLst>
+                          </p:cTn>
+                        </p:par>
+                      </p:childTnLst>
+                    </p:cTn>
+                  </p:par>
+                </p:childTnLst>
+              </p:cTn>
+              <p:prevCondLst>
+                <p:cond evt="onPrev" delay="0">
+                  <p:tgtEl>
+                    <p:sldTgt/>
+                  </p:tgtEl>
+                </p:cond>
+              </p:prevCondLst>
+              <p:nextCondLst>
+                <p:cond evt="onNext" delay="0">
+                  <p:tgtEl>
+                    <p:sldTgt/>
+                  </p:tgtEl>
+                </p:cond>
+              </p:nextCondLst>
+            </p:seq>
+          </p:childTnLst>
+        </p:cTn>
+      </p:par>
+    </p:tnLst>
+    <p:bldLst>
+      <p:bldP spid="5" grpId="0"/>
+    </p:bldLst>
+  </p:timing>
+</p:sld>
+</file>
+
+<file path=ppt/slides/slide16.xml><?xml version="1.0" encoding="utf-8"?>
+<p:sld xmlns:a="http://schemas.openxmlformats.org/drawingml/2006/main" xmlns:r="http://schemas.openxmlformats.org/officeDocument/2006/relationships" xmlns:p="http://schemas.openxmlformats.org/presentationml/2006/main">
+  <p:cSld>
+    <p:spTree>
+      <p:nvGrpSpPr>
+        <p:cNvPr id="1" name=""/>
+        <p:cNvGrpSpPr/>
+        <p:nvPr/>
+      </p:nvGrpSpPr>
+      <p:grpSpPr>
+        <a:xfrm>
+          <a:off x="0" y="0"/>
+          <a:ext cx="0" cy="0"/>
+          <a:chOff x="0" y="0"/>
+          <a:chExt cx="0" cy="0"/>
+        </a:xfrm>
+      </p:grpSpPr>
+      <p:sp>
+        <p:nvSpPr>
+          <p:cNvPr id="2" name="Título 1"/>
+          <p:cNvSpPr>
+            <a:spLocks noGrp="1"/>
+          </p:cNvSpPr>
+          <p:nvPr>
+            <p:ph type="title"/>
+          </p:nvPr>
+        </p:nvSpPr>
+        <p:spPr/>
+        <p:txBody>
+          <a:bodyPr>
+            <a:normAutofit fontScale="90000"/>
+          </a:bodyPr>
+          <a:lstStyle/>
+          <a:p>
+            <a:r>
+              <a:rPr lang="pt-BR" dirty="0" smtClean="0"/>
+              <a:t>Fundamentação Teórica</a:t>
+            </a:r>
+            <a:br>
+              <a:rPr lang="pt-BR" dirty="0" smtClean="0"/>
+            </a:br>
+            <a:r>
+              <a:rPr lang="pt-BR" sz="3100" dirty="0" smtClean="0"/>
+              <a:t>Motores de Gabaritos</a:t>
+            </a:r>
+            <a:endParaRPr lang="pt-BR" dirty="0"/>
+          </a:p>
+        </p:txBody>
+      </p:sp>
+      <p:sp>
+        <p:nvSpPr>
+          <p:cNvPr id="5" name="CaixaDeTexto 4"/>
+          <p:cNvSpPr txBox="1"/>
+          <p:nvPr/>
+        </p:nvSpPr>
+        <p:spPr>
+          <a:xfrm>
+            <a:off x="251520" y="2276286"/>
+            <a:ext cx="8496944" cy="3600986"/>
+          </a:xfrm>
+          <a:prstGeom prst="rect">
+            <a:avLst/>
+          </a:prstGeom>
+          <a:noFill/>
+        </p:spPr>
+        <p:txBody>
+          <a:bodyPr wrap="square" rtlCol="0">
+            <a:spAutoFit/>
+          </a:bodyPr>
+          <a:lstStyle/>
+          <a:p>
+            <a:r>
+              <a:rPr lang="pt-BR" dirty="0">
+                <a:latin typeface="Consolas" panose="020B0609020204030204" pitchFamily="49" charset="0"/>
+              </a:rPr>
+              <a:t> </a:t>
+            </a:r>
+            <a:r>
+              <a:rPr lang="pt-BR" sz="1400" dirty="0">
+                <a:latin typeface="Consolas" panose="020B0609020204030204" pitchFamily="49" charset="0"/>
+              </a:rPr>
+              <a:t>&lt;</a:t>
+            </a:r>
+            <a:r>
+              <a:rPr lang="pt-BR" sz="1400" dirty="0" err="1">
+                <a:latin typeface="Consolas" panose="020B0609020204030204" pitchFamily="49" charset="0"/>
+              </a:rPr>
+              <a:t>div</a:t>
+            </a:r>
+            <a:r>
+              <a:rPr lang="pt-BR" sz="1400" dirty="0">
+                <a:latin typeface="Consolas" panose="020B0609020204030204" pitchFamily="49" charset="0"/>
+              </a:rPr>
+              <a:t> id="</a:t>
+            </a:r>
+            <a:r>
+              <a:rPr lang="pt-BR" sz="1400" b="1" dirty="0">
+                <a:latin typeface="Consolas" panose="020B0609020204030204" pitchFamily="49" charset="0"/>
+              </a:rPr>
+              <a:t>grafico1</a:t>
+            </a:r>
+            <a:r>
+              <a:rPr lang="pt-BR" sz="1400" dirty="0">
+                <a:latin typeface="Consolas" panose="020B0609020204030204" pitchFamily="49" charset="0"/>
+              </a:rPr>
+              <a:t>" </a:t>
+            </a:r>
+            <a:r>
+              <a:rPr lang="pt-BR" sz="1400" dirty="0" err="1">
+                <a:latin typeface="Consolas" panose="020B0609020204030204" pitchFamily="49" charset="0"/>
+              </a:rPr>
+              <a:t>class</a:t>
+            </a:r>
+            <a:r>
+              <a:rPr lang="pt-BR" sz="1400" dirty="0">
+                <a:latin typeface="Consolas" panose="020B0609020204030204" pitchFamily="49" charset="0"/>
+              </a:rPr>
+              <a:t>='col-xs-12 col-md-12 col-lg-4</a:t>
+            </a:r>
+            <a:r>
+              <a:rPr lang="pt-BR" sz="1400" dirty="0" smtClean="0">
+                <a:latin typeface="Consolas" panose="020B0609020204030204" pitchFamily="49" charset="0"/>
+              </a:rPr>
+              <a:t>'&gt;&lt;</a:t>
+            </a:r>
+            <a:r>
+              <a:rPr lang="pt-BR" sz="1400" dirty="0" err="1">
+                <a:latin typeface="Consolas" panose="020B0609020204030204" pitchFamily="49" charset="0"/>
+              </a:rPr>
+              <a:t>strong</a:t>
+            </a:r>
+            <a:r>
+              <a:rPr lang="pt-BR" sz="1400" dirty="0">
+                <a:latin typeface="Consolas" panose="020B0609020204030204" pitchFamily="49" charset="0"/>
+              </a:rPr>
+              <a:t>&gt;</a:t>
+            </a:r>
+            <a:r>
+              <a:rPr lang="pt-BR" sz="1400" b="1" dirty="0">
+                <a:latin typeface="Consolas" panose="020B0609020204030204" pitchFamily="49" charset="0"/>
+              </a:rPr>
+              <a:t>Sexo</a:t>
+            </a:r>
+            <a:r>
+              <a:rPr lang="pt-BR" sz="1400" dirty="0">
+                <a:latin typeface="Consolas" panose="020B0609020204030204" pitchFamily="49" charset="0"/>
+              </a:rPr>
+              <a:t>&lt;/</a:t>
+            </a:r>
+            <a:r>
+              <a:rPr lang="pt-BR" sz="1400" dirty="0" err="1">
+                <a:latin typeface="Consolas" panose="020B0609020204030204" pitchFamily="49" charset="0"/>
+              </a:rPr>
+              <a:t>strong</a:t>
+            </a:r>
+            <a:r>
+              <a:rPr lang="pt-BR" sz="1400" dirty="0">
+                <a:latin typeface="Consolas" panose="020B0609020204030204" pitchFamily="49" charset="0"/>
+              </a:rPr>
+              <a:t>&gt;                </a:t>
+            </a:r>
+            <a:endParaRPr lang="pt-BR" sz="1400" dirty="0" smtClean="0">
+              <a:latin typeface="Consolas" panose="020B0609020204030204" pitchFamily="49" charset="0"/>
+            </a:endParaRPr>
+          </a:p>
+          <a:p>
+            <a:pPr lvl="1"/>
+            <a:r>
+              <a:rPr lang="pt-BR" sz="1400" dirty="0" smtClean="0">
+                <a:latin typeface="Consolas" panose="020B0609020204030204" pitchFamily="49" charset="0"/>
+              </a:rPr>
+              <a:t>&lt;</a:t>
+            </a:r>
+            <a:r>
+              <a:rPr lang="pt-BR" sz="1400" dirty="0" err="1">
+                <a:latin typeface="Consolas" panose="020B0609020204030204" pitchFamily="49" charset="0"/>
+              </a:rPr>
+              <a:t>span</a:t>
+            </a:r>
+            <a:r>
+              <a:rPr lang="pt-BR" sz="1400" dirty="0">
+                <a:latin typeface="Consolas" panose="020B0609020204030204" pitchFamily="49" charset="0"/>
+              </a:rPr>
+              <a:t> </a:t>
+            </a:r>
+            <a:r>
+              <a:rPr lang="pt-BR" sz="1400" dirty="0" err="1">
+                <a:latin typeface="Consolas" panose="020B0609020204030204" pitchFamily="49" charset="0"/>
+              </a:rPr>
+              <a:t>class</a:t>
+            </a:r>
+            <a:r>
+              <a:rPr lang="pt-BR" sz="1400" dirty="0">
+                <a:latin typeface="Consolas" panose="020B0609020204030204" pitchFamily="49" charset="0"/>
+              </a:rPr>
+              <a:t>="reset" </a:t>
+            </a:r>
+            <a:r>
+              <a:rPr lang="pt-BR" sz="1400" dirty="0" err="1">
+                <a:latin typeface="Consolas" panose="020B0609020204030204" pitchFamily="49" charset="0"/>
+              </a:rPr>
+              <a:t>style</a:t>
+            </a:r>
+            <a:r>
+              <a:rPr lang="pt-BR" sz="1400" dirty="0">
+                <a:latin typeface="Consolas" panose="020B0609020204030204" pitchFamily="49" charset="0"/>
+              </a:rPr>
+              <a:t>="display: </a:t>
+            </a:r>
+            <a:r>
+              <a:rPr lang="pt-BR" sz="1400" dirty="0" err="1">
+                <a:latin typeface="Consolas" panose="020B0609020204030204" pitchFamily="49" charset="0"/>
+              </a:rPr>
+              <a:t>none</a:t>
+            </a:r>
+            <a:r>
+              <a:rPr lang="pt-BR" sz="1400" dirty="0">
+                <a:latin typeface="Consolas" panose="020B0609020204030204" pitchFamily="49" charset="0"/>
+              </a:rPr>
+              <a:t>;"&gt;</a:t>
+            </a:r>
+            <a:r>
+              <a:rPr lang="pt-BR" sz="1400" dirty="0" err="1">
+                <a:latin typeface="Consolas" panose="020B0609020204030204" pitchFamily="49" charset="0"/>
+              </a:rPr>
+              <a:t>Selected</a:t>
+            </a:r>
+            <a:r>
+              <a:rPr lang="pt-BR" sz="1400" dirty="0">
+                <a:latin typeface="Consolas" panose="020B0609020204030204" pitchFamily="49" charset="0"/>
+              </a:rPr>
+              <a:t>: &lt;</a:t>
+            </a:r>
+            <a:r>
+              <a:rPr lang="pt-BR" sz="1400" dirty="0" err="1">
+                <a:latin typeface="Consolas" panose="020B0609020204030204" pitchFamily="49" charset="0"/>
+              </a:rPr>
+              <a:t>span</a:t>
+            </a:r>
+            <a:r>
+              <a:rPr lang="pt-BR" sz="1400" dirty="0">
+                <a:latin typeface="Consolas" panose="020B0609020204030204" pitchFamily="49" charset="0"/>
+              </a:rPr>
+              <a:t> </a:t>
+            </a:r>
+            <a:r>
+              <a:rPr lang="pt-BR" sz="1400" dirty="0" err="1">
+                <a:latin typeface="Consolas" panose="020B0609020204030204" pitchFamily="49" charset="0"/>
+              </a:rPr>
+              <a:t>class</a:t>
+            </a:r>
+            <a:r>
+              <a:rPr lang="pt-BR" sz="1400" dirty="0">
+                <a:latin typeface="Consolas" panose="020B0609020204030204" pitchFamily="49" charset="0"/>
+              </a:rPr>
+              <a:t>="</a:t>
+            </a:r>
+            <a:r>
+              <a:rPr lang="pt-BR" sz="1400" dirty="0" err="1">
+                <a:latin typeface="Consolas" panose="020B0609020204030204" pitchFamily="49" charset="0"/>
+              </a:rPr>
+              <a:t>filter</a:t>
+            </a:r>
+            <a:r>
+              <a:rPr lang="pt-BR" sz="1400" dirty="0">
+                <a:latin typeface="Consolas" panose="020B0609020204030204" pitchFamily="49" charset="0"/>
+              </a:rPr>
+              <a:t>"&gt;&lt;/</a:t>
+            </a:r>
+            <a:r>
+              <a:rPr lang="pt-BR" sz="1400" dirty="0" err="1">
+                <a:latin typeface="Consolas" panose="020B0609020204030204" pitchFamily="49" charset="0"/>
+              </a:rPr>
+              <a:t>span</a:t>
+            </a:r>
+            <a:r>
+              <a:rPr lang="pt-BR" sz="1400" dirty="0">
+                <a:latin typeface="Consolas" panose="020B0609020204030204" pitchFamily="49" charset="0"/>
+              </a:rPr>
+              <a:t>&gt;&lt;/</a:t>
+            </a:r>
+            <a:r>
+              <a:rPr lang="pt-BR" sz="1400" dirty="0" err="1">
+                <a:latin typeface="Consolas" panose="020B0609020204030204" pitchFamily="49" charset="0"/>
+              </a:rPr>
+              <a:t>span</a:t>
+            </a:r>
+            <a:r>
+              <a:rPr lang="pt-BR" sz="1400" dirty="0">
+                <a:latin typeface="Consolas" panose="020B0609020204030204" pitchFamily="49" charset="0"/>
+              </a:rPr>
+              <a:t>&gt;                </a:t>
+            </a:r>
+            <a:endParaRPr lang="pt-BR" sz="1400" dirty="0" smtClean="0">
+              <a:latin typeface="Consolas" panose="020B0609020204030204" pitchFamily="49" charset="0"/>
+            </a:endParaRPr>
+          </a:p>
+          <a:p>
+            <a:pPr lvl="1"/>
+            <a:r>
+              <a:rPr lang="pt-BR" sz="1400" dirty="0" smtClean="0">
+                <a:latin typeface="Consolas" panose="020B0609020204030204" pitchFamily="49" charset="0"/>
+              </a:rPr>
+              <a:t>&lt;</a:t>
+            </a:r>
+            <a:r>
+              <a:rPr lang="pt-BR" sz="1400" dirty="0">
+                <a:latin typeface="Consolas" panose="020B0609020204030204" pitchFamily="49" charset="0"/>
+              </a:rPr>
+              <a:t>a </a:t>
+            </a:r>
+            <a:r>
+              <a:rPr lang="pt-BR" sz="1400" dirty="0" err="1">
+                <a:latin typeface="Consolas" panose="020B0609020204030204" pitchFamily="49" charset="0"/>
+              </a:rPr>
+              <a:t>class</a:t>
+            </a:r>
+            <a:r>
+              <a:rPr lang="pt-BR" sz="1400" dirty="0">
+                <a:latin typeface="Consolas" panose="020B0609020204030204" pitchFamily="49" charset="0"/>
+              </a:rPr>
+              <a:t>="reset" </a:t>
+            </a:r>
+            <a:r>
+              <a:rPr lang="pt-BR" sz="1400" dirty="0" err="1">
+                <a:latin typeface="Consolas" panose="020B0609020204030204" pitchFamily="49" charset="0"/>
+              </a:rPr>
+              <a:t>href</a:t>
+            </a:r>
+            <a:r>
+              <a:rPr lang="pt-BR" sz="1400" dirty="0">
+                <a:latin typeface="Consolas" panose="020B0609020204030204" pitchFamily="49" charset="0"/>
+              </a:rPr>
+              <a:t>="javascript:</a:t>
+            </a:r>
+            <a:r>
+              <a:rPr lang="pt-BR" sz="1400" b="1" dirty="0">
+                <a:latin typeface="Consolas" panose="020B0609020204030204" pitchFamily="49" charset="0"/>
+              </a:rPr>
+              <a:t>grafico1</a:t>
+            </a:r>
+            <a:r>
+              <a:rPr lang="pt-BR" sz="1400" dirty="0">
+                <a:latin typeface="Consolas" panose="020B0609020204030204" pitchFamily="49" charset="0"/>
+              </a:rPr>
+              <a:t>.filterAll();</a:t>
+            </a:r>
+            <a:r>
+              <a:rPr lang="pt-BR" sz="1400" dirty="0" err="1">
+                <a:latin typeface="Consolas" panose="020B0609020204030204" pitchFamily="49" charset="0"/>
+              </a:rPr>
+              <a:t>dc.redrawAll</a:t>
+            </a:r>
+            <a:r>
+              <a:rPr lang="pt-BR" sz="1400" dirty="0">
+                <a:latin typeface="Consolas" panose="020B0609020204030204" pitchFamily="49" charset="0"/>
+              </a:rPr>
+              <a:t>();" </a:t>
+            </a:r>
+            <a:r>
+              <a:rPr lang="pt-BR" sz="1400" dirty="0" err="1" smtClean="0">
+                <a:latin typeface="Consolas" panose="020B0609020204030204" pitchFamily="49" charset="0"/>
+              </a:rPr>
+              <a:t>style</a:t>
+            </a:r>
+            <a:r>
+              <a:rPr lang="pt-BR" sz="1400" dirty="0">
+                <a:latin typeface="Consolas" panose="020B0609020204030204" pitchFamily="49" charset="0"/>
+              </a:rPr>
+              <a:t>="</a:t>
+            </a:r>
+            <a:r>
+              <a:rPr lang="pt-BR" sz="1400" dirty="0" err="1" smtClean="0">
+                <a:latin typeface="Consolas" panose="020B0609020204030204" pitchFamily="49" charset="0"/>
+              </a:rPr>
+              <a:t>display:none</a:t>
+            </a:r>
+            <a:r>
+              <a:rPr lang="pt-BR" sz="1400" dirty="0">
+                <a:latin typeface="Consolas" panose="020B0609020204030204" pitchFamily="49" charset="0"/>
+              </a:rPr>
+              <a:t>;"&gt;reset&lt;/a</a:t>
+            </a:r>
+            <a:r>
+              <a:rPr lang="pt-BR" sz="1400" dirty="0" smtClean="0">
+                <a:latin typeface="Consolas" panose="020B0609020204030204" pitchFamily="49" charset="0"/>
+              </a:rPr>
+              <a:t>&gt;</a:t>
+            </a:r>
+          </a:p>
+          <a:p>
+            <a:pPr lvl="1"/>
+            <a:r>
+              <a:rPr lang="pt-BR" sz="1400" dirty="0" smtClean="0">
+                <a:latin typeface="Consolas" panose="020B0609020204030204" pitchFamily="49" charset="0"/>
+              </a:rPr>
+              <a:t> &lt;</a:t>
+            </a:r>
+            <a:r>
+              <a:rPr lang="pt-BR" sz="1400" dirty="0" err="1">
+                <a:latin typeface="Consolas" panose="020B0609020204030204" pitchFamily="49" charset="0"/>
+              </a:rPr>
+              <a:t>div</a:t>
+            </a:r>
+            <a:r>
+              <a:rPr lang="pt-BR" sz="1400" dirty="0">
+                <a:latin typeface="Consolas" panose="020B0609020204030204" pitchFamily="49" charset="0"/>
+              </a:rPr>
+              <a:t> </a:t>
+            </a:r>
+            <a:r>
+              <a:rPr lang="pt-BR" sz="1400" dirty="0" err="1">
+                <a:latin typeface="Consolas" panose="020B0609020204030204" pitchFamily="49" charset="0"/>
+              </a:rPr>
+              <a:t>class</a:t>
+            </a:r>
+            <a:r>
+              <a:rPr lang="pt-BR" sz="1400" dirty="0">
+                <a:latin typeface="Consolas" panose="020B0609020204030204" pitchFamily="49" charset="0"/>
+              </a:rPr>
+              <a:t>="</a:t>
+            </a:r>
+            <a:r>
+              <a:rPr lang="pt-BR" sz="1400" dirty="0" err="1">
+                <a:latin typeface="Consolas" panose="020B0609020204030204" pitchFamily="49" charset="0"/>
+              </a:rPr>
+              <a:t>clearfix</a:t>
+            </a:r>
+            <a:r>
+              <a:rPr lang="pt-BR" sz="1400" dirty="0">
+                <a:latin typeface="Consolas" panose="020B0609020204030204" pitchFamily="49" charset="0"/>
+              </a:rPr>
+              <a:t>"&gt;&lt;/</a:t>
+            </a:r>
+            <a:r>
+              <a:rPr lang="pt-BR" sz="1400" dirty="0" err="1">
+                <a:latin typeface="Consolas" panose="020B0609020204030204" pitchFamily="49" charset="0"/>
+              </a:rPr>
+              <a:t>div</a:t>
+            </a:r>
+            <a:r>
+              <a:rPr lang="pt-BR" sz="1400" dirty="0" smtClean="0">
+                <a:latin typeface="Consolas" panose="020B0609020204030204" pitchFamily="49" charset="0"/>
+              </a:rPr>
+              <a:t>&gt;</a:t>
+            </a:r>
+          </a:p>
+          <a:p>
+            <a:r>
+              <a:rPr lang="pt-BR" sz="1400" dirty="0" smtClean="0">
+                <a:latin typeface="Consolas" panose="020B0609020204030204" pitchFamily="49" charset="0"/>
+              </a:rPr>
+              <a:t>&lt;/</a:t>
+            </a:r>
+            <a:r>
+              <a:rPr lang="pt-BR" sz="1400" dirty="0" err="1">
+                <a:latin typeface="Consolas" panose="020B0609020204030204" pitchFamily="49" charset="0"/>
+              </a:rPr>
+              <a:t>div</a:t>
+            </a:r>
+            <a:r>
+              <a:rPr lang="pt-BR" sz="1400" dirty="0">
+                <a:latin typeface="Consolas" panose="020B0609020204030204" pitchFamily="49" charset="0"/>
+              </a:rPr>
+              <a:t>&gt;            </a:t>
+            </a:r>
+            <a:endParaRPr lang="pt-BR" sz="1400" dirty="0" smtClean="0">
+              <a:latin typeface="Consolas" panose="020B0609020204030204" pitchFamily="49" charset="0"/>
+            </a:endParaRPr>
+          </a:p>
+          <a:p>
+            <a:endParaRPr lang="pt-BR" sz="1400" dirty="0">
+              <a:latin typeface="Consolas" panose="020B0609020204030204" pitchFamily="49" charset="0"/>
+            </a:endParaRPr>
+          </a:p>
+          <a:p>
+            <a:r>
+              <a:rPr lang="pt-BR" sz="1400" dirty="0" smtClean="0">
+                <a:latin typeface="Consolas" panose="020B0609020204030204" pitchFamily="49" charset="0"/>
+              </a:rPr>
+              <a:t>&lt;</a:t>
+            </a:r>
+            <a:r>
+              <a:rPr lang="pt-BR" sz="1400" dirty="0" err="1">
+                <a:latin typeface="Consolas" panose="020B0609020204030204" pitchFamily="49" charset="0"/>
+              </a:rPr>
+              <a:t>div</a:t>
+            </a:r>
+            <a:r>
+              <a:rPr lang="pt-BR" sz="1400" dirty="0">
+                <a:latin typeface="Consolas" panose="020B0609020204030204" pitchFamily="49" charset="0"/>
+              </a:rPr>
+              <a:t> id="</a:t>
+            </a:r>
+            <a:r>
+              <a:rPr lang="pt-BR" sz="1400" b="1" dirty="0">
+                <a:latin typeface="Consolas" panose="020B0609020204030204" pitchFamily="49" charset="0"/>
+              </a:rPr>
+              <a:t>grafico2</a:t>
+            </a:r>
+            <a:r>
+              <a:rPr lang="pt-BR" sz="1400" dirty="0">
+                <a:latin typeface="Consolas" panose="020B0609020204030204" pitchFamily="49" charset="0"/>
+              </a:rPr>
+              <a:t>" </a:t>
+            </a:r>
+            <a:r>
+              <a:rPr lang="pt-BR" sz="1400" dirty="0" err="1">
+                <a:latin typeface="Consolas" panose="020B0609020204030204" pitchFamily="49" charset="0"/>
+              </a:rPr>
+              <a:t>class</a:t>
+            </a:r>
+            <a:r>
+              <a:rPr lang="pt-BR" sz="1400" dirty="0">
+                <a:latin typeface="Consolas" panose="020B0609020204030204" pitchFamily="49" charset="0"/>
+              </a:rPr>
+              <a:t>='col-xs-12 col-md-12 col-lg-4</a:t>
+            </a:r>
+            <a:r>
+              <a:rPr lang="pt-BR" sz="1400" dirty="0" smtClean="0">
+                <a:latin typeface="Consolas" panose="020B0609020204030204" pitchFamily="49" charset="0"/>
+              </a:rPr>
+              <a:t>'&gt;&lt;</a:t>
+            </a:r>
+            <a:r>
+              <a:rPr lang="pt-BR" sz="1400" dirty="0" err="1">
+                <a:latin typeface="Consolas" panose="020B0609020204030204" pitchFamily="49" charset="0"/>
+              </a:rPr>
+              <a:t>strong</a:t>
+            </a:r>
+            <a:r>
+              <a:rPr lang="pt-BR" sz="1400" dirty="0">
+                <a:latin typeface="Consolas" panose="020B0609020204030204" pitchFamily="49" charset="0"/>
+              </a:rPr>
+              <a:t>&gt;</a:t>
+            </a:r>
+            <a:r>
+              <a:rPr lang="pt-BR" sz="1400" b="1" dirty="0" err="1">
+                <a:latin typeface="Consolas" panose="020B0609020204030204" pitchFamily="49" charset="0"/>
+              </a:rPr>
+              <a:t>Religiao</a:t>
+            </a:r>
+            <a:r>
+              <a:rPr lang="pt-BR" sz="1400" dirty="0">
+                <a:latin typeface="Consolas" panose="020B0609020204030204" pitchFamily="49" charset="0"/>
+              </a:rPr>
+              <a:t>&lt;/</a:t>
+            </a:r>
+            <a:r>
+              <a:rPr lang="pt-BR" sz="1400" dirty="0" err="1">
+                <a:latin typeface="Consolas" panose="020B0609020204030204" pitchFamily="49" charset="0"/>
+              </a:rPr>
+              <a:t>strong</a:t>
+            </a:r>
+            <a:r>
+              <a:rPr lang="pt-BR" sz="1400" dirty="0">
+                <a:latin typeface="Consolas" panose="020B0609020204030204" pitchFamily="49" charset="0"/>
+              </a:rPr>
+              <a:t>&gt;                </a:t>
+            </a:r>
+            <a:endParaRPr lang="pt-BR" sz="1400" dirty="0" smtClean="0">
+              <a:latin typeface="Consolas" panose="020B0609020204030204" pitchFamily="49" charset="0"/>
+            </a:endParaRPr>
+          </a:p>
+          <a:p>
+            <a:pPr lvl="1"/>
+            <a:r>
+              <a:rPr lang="pt-BR" sz="1400" dirty="0" smtClean="0">
+                <a:latin typeface="Consolas" panose="020B0609020204030204" pitchFamily="49" charset="0"/>
+              </a:rPr>
+              <a:t>&lt;</a:t>
+            </a:r>
+            <a:r>
+              <a:rPr lang="pt-BR" sz="1400" dirty="0" err="1">
+                <a:latin typeface="Consolas" panose="020B0609020204030204" pitchFamily="49" charset="0"/>
+              </a:rPr>
+              <a:t>span</a:t>
+            </a:r>
+            <a:r>
+              <a:rPr lang="pt-BR" sz="1400" dirty="0">
+                <a:latin typeface="Consolas" panose="020B0609020204030204" pitchFamily="49" charset="0"/>
+              </a:rPr>
+              <a:t> </a:t>
+            </a:r>
+            <a:r>
+              <a:rPr lang="pt-BR" sz="1400" dirty="0" err="1">
+                <a:latin typeface="Consolas" panose="020B0609020204030204" pitchFamily="49" charset="0"/>
+              </a:rPr>
+              <a:t>class</a:t>
+            </a:r>
+            <a:r>
+              <a:rPr lang="pt-BR" sz="1400" dirty="0">
+                <a:latin typeface="Consolas" panose="020B0609020204030204" pitchFamily="49" charset="0"/>
+              </a:rPr>
+              <a:t>="reset" </a:t>
+            </a:r>
+            <a:r>
+              <a:rPr lang="pt-BR" sz="1400" dirty="0" err="1">
+                <a:latin typeface="Consolas" panose="020B0609020204030204" pitchFamily="49" charset="0"/>
+              </a:rPr>
+              <a:t>style</a:t>
+            </a:r>
+            <a:r>
+              <a:rPr lang="pt-BR" sz="1400" dirty="0">
+                <a:latin typeface="Consolas" panose="020B0609020204030204" pitchFamily="49" charset="0"/>
+              </a:rPr>
+              <a:t>="display: </a:t>
+            </a:r>
+            <a:r>
+              <a:rPr lang="pt-BR" sz="1400" dirty="0" err="1">
+                <a:latin typeface="Consolas" panose="020B0609020204030204" pitchFamily="49" charset="0"/>
+              </a:rPr>
+              <a:t>none</a:t>
+            </a:r>
+            <a:r>
+              <a:rPr lang="pt-BR" sz="1400" dirty="0">
+                <a:latin typeface="Consolas" panose="020B0609020204030204" pitchFamily="49" charset="0"/>
+              </a:rPr>
+              <a:t>;"&gt;</a:t>
+            </a:r>
+            <a:r>
+              <a:rPr lang="pt-BR" sz="1400" dirty="0" err="1">
+                <a:latin typeface="Consolas" panose="020B0609020204030204" pitchFamily="49" charset="0"/>
+              </a:rPr>
+              <a:t>Selected</a:t>
+            </a:r>
+            <a:r>
+              <a:rPr lang="pt-BR" sz="1400" dirty="0">
+                <a:latin typeface="Consolas" panose="020B0609020204030204" pitchFamily="49" charset="0"/>
+              </a:rPr>
+              <a:t>: &lt;</a:t>
+            </a:r>
+            <a:r>
+              <a:rPr lang="pt-BR" sz="1400" dirty="0" err="1">
+                <a:latin typeface="Consolas" panose="020B0609020204030204" pitchFamily="49" charset="0"/>
+              </a:rPr>
+              <a:t>span</a:t>
+            </a:r>
+            <a:r>
+              <a:rPr lang="pt-BR" sz="1400" dirty="0">
+                <a:latin typeface="Consolas" panose="020B0609020204030204" pitchFamily="49" charset="0"/>
+              </a:rPr>
+              <a:t> </a:t>
+            </a:r>
+            <a:r>
+              <a:rPr lang="pt-BR" sz="1400" dirty="0" err="1">
+                <a:latin typeface="Consolas" panose="020B0609020204030204" pitchFamily="49" charset="0"/>
+              </a:rPr>
+              <a:t>class</a:t>
+            </a:r>
+            <a:r>
+              <a:rPr lang="pt-BR" sz="1400" dirty="0">
+                <a:latin typeface="Consolas" panose="020B0609020204030204" pitchFamily="49" charset="0"/>
+              </a:rPr>
+              <a:t>="</a:t>
+            </a:r>
+            <a:r>
+              <a:rPr lang="pt-BR" sz="1400" dirty="0" err="1">
+                <a:latin typeface="Consolas" panose="020B0609020204030204" pitchFamily="49" charset="0"/>
+              </a:rPr>
+              <a:t>filter</a:t>
+            </a:r>
+            <a:r>
+              <a:rPr lang="pt-BR" sz="1400" dirty="0">
+                <a:latin typeface="Consolas" panose="020B0609020204030204" pitchFamily="49" charset="0"/>
+              </a:rPr>
+              <a:t>"&gt;&lt;/</a:t>
+            </a:r>
+            <a:r>
+              <a:rPr lang="pt-BR" sz="1400" dirty="0" err="1">
+                <a:latin typeface="Consolas" panose="020B0609020204030204" pitchFamily="49" charset="0"/>
+              </a:rPr>
+              <a:t>span</a:t>
+            </a:r>
+            <a:r>
+              <a:rPr lang="pt-BR" sz="1400" dirty="0">
+                <a:latin typeface="Consolas" panose="020B0609020204030204" pitchFamily="49" charset="0"/>
+              </a:rPr>
+              <a:t>&gt;&lt;/</a:t>
+            </a:r>
+            <a:r>
+              <a:rPr lang="pt-BR" sz="1400" dirty="0" err="1">
+                <a:latin typeface="Consolas" panose="020B0609020204030204" pitchFamily="49" charset="0"/>
+              </a:rPr>
+              <a:t>span</a:t>
+            </a:r>
+            <a:r>
+              <a:rPr lang="pt-BR" sz="1400" dirty="0">
+                <a:latin typeface="Consolas" panose="020B0609020204030204" pitchFamily="49" charset="0"/>
+              </a:rPr>
+              <a:t>&gt;                </a:t>
+            </a:r>
+            <a:endParaRPr lang="pt-BR" sz="1400" dirty="0" smtClean="0">
+              <a:latin typeface="Consolas" panose="020B0609020204030204" pitchFamily="49" charset="0"/>
+            </a:endParaRPr>
+          </a:p>
+          <a:p>
+            <a:pPr lvl="1"/>
+            <a:r>
+              <a:rPr lang="pt-BR" sz="1400" dirty="0" smtClean="0">
+                <a:latin typeface="Consolas" panose="020B0609020204030204" pitchFamily="49" charset="0"/>
+              </a:rPr>
+              <a:t>&lt;</a:t>
+            </a:r>
+            <a:r>
+              <a:rPr lang="pt-BR" sz="1400" dirty="0">
+                <a:latin typeface="Consolas" panose="020B0609020204030204" pitchFamily="49" charset="0"/>
+              </a:rPr>
+              <a:t>a </a:t>
+            </a:r>
+            <a:r>
+              <a:rPr lang="pt-BR" sz="1400" dirty="0" err="1">
+                <a:latin typeface="Consolas" panose="020B0609020204030204" pitchFamily="49" charset="0"/>
+              </a:rPr>
+              <a:t>class</a:t>
+            </a:r>
+            <a:r>
+              <a:rPr lang="pt-BR" sz="1400" dirty="0">
+                <a:latin typeface="Consolas" panose="020B0609020204030204" pitchFamily="49" charset="0"/>
+              </a:rPr>
+              <a:t>="reset" </a:t>
+            </a:r>
+            <a:r>
+              <a:rPr lang="pt-BR" sz="1400" dirty="0" err="1">
+                <a:latin typeface="Consolas" panose="020B0609020204030204" pitchFamily="49" charset="0"/>
+              </a:rPr>
+              <a:t>href</a:t>
+            </a:r>
+            <a:r>
+              <a:rPr lang="pt-BR" sz="1400" dirty="0">
+                <a:latin typeface="Consolas" panose="020B0609020204030204" pitchFamily="49" charset="0"/>
+              </a:rPr>
+              <a:t>="javascript:</a:t>
+            </a:r>
+            <a:r>
+              <a:rPr lang="pt-BR" sz="1400" b="1" dirty="0">
+                <a:latin typeface="Consolas" panose="020B0609020204030204" pitchFamily="49" charset="0"/>
+              </a:rPr>
+              <a:t>grafico2</a:t>
+            </a:r>
+            <a:r>
+              <a:rPr lang="pt-BR" sz="1400" dirty="0">
+                <a:latin typeface="Consolas" panose="020B0609020204030204" pitchFamily="49" charset="0"/>
+              </a:rPr>
+              <a:t>.filterAll();</a:t>
+            </a:r>
+            <a:r>
+              <a:rPr lang="pt-BR" sz="1400" dirty="0" err="1">
+                <a:latin typeface="Consolas" panose="020B0609020204030204" pitchFamily="49" charset="0"/>
+              </a:rPr>
+              <a:t>dc.redrawAll</a:t>
+            </a:r>
+            <a:r>
+              <a:rPr lang="pt-BR" sz="1400" dirty="0">
+                <a:latin typeface="Consolas" panose="020B0609020204030204" pitchFamily="49" charset="0"/>
+              </a:rPr>
+              <a:t>();" </a:t>
+            </a:r>
+            <a:r>
+              <a:rPr lang="pt-BR" sz="1400" dirty="0" err="1" smtClean="0">
+                <a:latin typeface="Consolas" panose="020B0609020204030204" pitchFamily="49" charset="0"/>
+              </a:rPr>
+              <a:t>style</a:t>
+            </a:r>
+            <a:r>
+              <a:rPr lang="pt-BR" sz="1400" dirty="0">
+                <a:latin typeface="Consolas" panose="020B0609020204030204" pitchFamily="49" charset="0"/>
+              </a:rPr>
+              <a:t>="display: </a:t>
+            </a:r>
+            <a:r>
+              <a:rPr lang="pt-BR" sz="1400" dirty="0" err="1">
+                <a:latin typeface="Consolas" panose="020B0609020204030204" pitchFamily="49" charset="0"/>
+              </a:rPr>
+              <a:t>none</a:t>
+            </a:r>
+            <a:r>
+              <a:rPr lang="pt-BR" sz="1400" dirty="0">
+                <a:latin typeface="Consolas" panose="020B0609020204030204" pitchFamily="49" charset="0"/>
+              </a:rPr>
+              <a:t>;"&gt;reset&lt;/a&gt;                &lt;</a:t>
+            </a:r>
+            <a:r>
+              <a:rPr lang="pt-BR" sz="1400" dirty="0" err="1">
+                <a:latin typeface="Consolas" panose="020B0609020204030204" pitchFamily="49" charset="0"/>
+              </a:rPr>
+              <a:t>div</a:t>
+            </a:r>
+            <a:r>
+              <a:rPr lang="pt-BR" sz="1400" dirty="0">
+                <a:latin typeface="Consolas" panose="020B0609020204030204" pitchFamily="49" charset="0"/>
+              </a:rPr>
+              <a:t> </a:t>
+            </a:r>
+            <a:r>
+              <a:rPr lang="pt-BR" sz="1400" dirty="0" err="1">
+                <a:latin typeface="Consolas" panose="020B0609020204030204" pitchFamily="49" charset="0"/>
+              </a:rPr>
+              <a:t>class</a:t>
+            </a:r>
+            <a:r>
+              <a:rPr lang="pt-BR" sz="1400" dirty="0">
+                <a:latin typeface="Consolas" panose="020B0609020204030204" pitchFamily="49" charset="0"/>
+              </a:rPr>
+              <a:t>="</a:t>
+            </a:r>
+            <a:r>
+              <a:rPr lang="pt-BR" sz="1400" dirty="0" err="1">
+                <a:latin typeface="Consolas" panose="020B0609020204030204" pitchFamily="49" charset="0"/>
+              </a:rPr>
+              <a:t>clearfix</a:t>
+            </a:r>
+            <a:r>
+              <a:rPr lang="pt-BR" sz="1400" dirty="0">
+                <a:latin typeface="Consolas" panose="020B0609020204030204" pitchFamily="49" charset="0"/>
+              </a:rPr>
+              <a:t>"&gt;&lt;/</a:t>
+            </a:r>
+            <a:r>
+              <a:rPr lang="pt-BR" sz="1400" dirty="0" err="1">
+                <a:latin typeface="Consolas" panose="020B0609020204030204" pitchFamily="49" charset="0"/>
+              </a:rPr>
+              <a:t>div</a:t>
+            </a:r>
+            <a:r>
+              <a:rPr lang="pt-BR" sz="1400" dirty="0">
+                <a:latin typeface="Consolas" panose="020B0609020204030204" pitchFamily="49" charset="0"/>
+              </a:rPr>
+              <a:t>&gt; </a:t>
+            </a:r>
+            <a:endParaRPr lang="pt-BR" sz="1400" dirty="0" smtClean="0">
+              <a:latin typeface="Consolas" panose="020B0609020204030204" pitchFamily="49" charset="0"/>
+            </a:endParaRPr>
+          </a:p>
+          <a:p>
+            <a:r>
+              <a:rPr lang="pt-BR" sz="1400" dirty="0" smtClean="0">
+                <a:latin typeface="Consolas" panose="020B0609020204030204" pitchFamily="49" charset="0"/>
+              </a:rPr>
+              <a:t>&lt;/</a:t>
+            </a:r>
+            <a:r>
+              <a:rPr lang="pt-BR" sz="1400" dirty="0" err="1">
+                <a:latin typeface="Consolas" panose="020B0609020204030204" pitchFamily="49" charset="0"/>
+              </a:rPr>
+              <a:t>div</a:t>
+            </a:r>
+            <a:r>
+              <a:rPr lang="pt-BR" sz="1400" dirty="0" smtClean="0">
+                <a:latin typeface="Consolas" panose="020B0609020204030204" pitchFamily="49" charset="0"/>
+              </a:rPr>
+              <a:t>&gt;</a:t>
+            </a:r>
+          </a:p>
+          <a:p>
+            <a:endParaRPr lang="pt-BR" sz="1400" dirty="0">
+              <a:latin typeface="Consolas" panose="020B0609020204030204" pitchFamily="49" charset="0"/>
+            </a:endParaRPr>
+          </a:p>
+          <a:p>
+            <a:r>
+              <a:rPr lang="pt-BR" sz="1400" dirty="0">
+                <a:latin typeface="Consolas" panose="020B0609020204030204" pitchFamily="49" charset="0"/>
+              </a:rPr>
+              <a:t>&lt;</a:t>
+            </a:r>
+            <a:r>
+              <a:rPr lang="pt-BR" sz="1400" dirty="0" err="1">
+                <a:latin typeface="Consolas" panose="020B0609020204030204" pitchFamily="49" charset="0"/>
+              </a:rPr>
+              <a:t>div</a:t>
+            </a:r>
+            <a:r>
+              <a:rPr lang="pt-BR" sz="1400" dirty="0">
+                <a:latin typeface="Consolas" panose="020B0609020204030204" pitchFamily="49" charset="0"/>
+              </a:rPr>
+              <a:t> id="</a:t>
+            </a:r>
+            <a:r>
+              <a:rPr lang="pt-BR" sz="1400" b="1" dirty="0" err="1" smtClean="0">
+                <a:latin typeface="Consolas" panose="020B0609020204030204" pitchFamily="49" charset="0"/>
+              </a:rPr>
+              <a:t>graficoN</a:t>
+            </a:r>
+            <a:r>
+              <a:rPr lang="pt-BR" sz="1400" dirty="0">
+                <a:latin typeface="Consolas" panose="020B0609020204030204" pitchFamily="49" charset="0"/>
+              </a:rPr>
+              <a:t>"</a:t>
+            </a:r>
+            <a:r>
+              <a:rPr lang="pt-BR" sz="1400" dirty="0" smtClean="0">
+                <a:latin typeface="Consolas" panose="020B0609020204030204" pitchFamily="49" charset="0"/>
+              </a:rPr>
+              <a:t>...</a:t>
+            </a:r>
+            <a:endParaRPr lang="pt-BR" sz="1400" dirty="0"/>
+          </a:p>
+        </p:txBody>
+      </p:sp>
+      <p:sp>
+        <p:nvSpPr>
+          <p:cNvPr id="6" name="CaixaDeTexto 5"/>
+          <p:cNvSpPr txBox="1"/>
+          <p:nvPr/>
+        </p:nvSpPr>
+        <p:spPr>
+          <a:xfrm>
+            <a:off x="539552" y="1628800"/>
+            <a:ext cx="1005403" cy="461665"/>
+          </a:xfrm>
+          <a:prstGeom prst="rect">
+            <a:avLst/>
+          </a:prstGeom>
+          <a:noFill/>
+        </p:spPr>
+        <p:txBody>
+          <a:bodyPr wrap="none" rtlCol="0">
+            <a:spAutoFit/>
+          </a:bodyPr>
+          <a:lstStyle/>
+          <a:p>
+            <a:r>
+              <a:rPr lang="pt-BR" sz="2400" b="1" dirty="0" smtClean="0"/>
+              <a:t>Saída</a:t>
+            </a:r>
+            <a:endParaRPr lang="pt-BR" b="1" dirty="0"/>
+          </a:p>
+        </p:txBody>
+      </p:sp>
+    </p:spTree>
+    <p:extLst>
+      <p:ext uri="{BB962C8B-B14F-4D97-AF65-F5344CB8AC3E}">
+        <p14:creationId xmlns:p14="http://schemas.microsoft.com/office/powerpoint/2010/main" val="50472887"/>
+      </p:ext>
+    </p:extLst>
+  </p:cSld>
+  <p:clrMapOvr>
+    <a:masterClrMapping/>
+  </p:clrMapOvr>
+  <p:timing>
+    <p:tnLst>
+      <p:par>
+        <p:cTn id="1" dur="indefinite" restart="never" nodeType="tmRoot">
+          <p:childTnLst>
+            <p:seq concurrent="1" nextAc="seek">
+              <p:cTn id="2" dur="indefinite" nodeType="mainSeq">
+                <p:childTnLst>
+                  <p:par>
+                    <p:cTn id="3" fill="hold">
+                      <p:stCondLst>
+                        <p:cond delay="indefinite"/>
+                      </p:stCondLst>
+                      <p:childTnLst>
+                        <p:par>
+                          <p:cTn id="4" fill="hold">
+                            <p:stCondLst>
+                              <p:cond delay="0"/>
+                            </p:stCondLst>
+                            <p:childTnLst>
+                              <p:par>
+                                <p:cTn id="5" presetID="53" presetClass="entr" presetSubtype="16" fill="hold" grpId="0" nodeType="clickEffect">
+                                  <p:stCondLst>
+                                    <p:cond delay="0"/>
+                                  </p:stCondLst>
+                                  <p:childTnLst>
+                                    <p:set>
+                                      <p:cBhvr>
+                                        <p:cTn id="6" dur="1" fill="hold">
+                                          <p:stCondLst>
+                                            <p:cond delay="0"/>
+                                          </p:stCondLst>
+                                        </p:cTn>
+                                        <p:tgtEl>
+                                          <p:spTgt spid="5"/>
+                                        </p:tgtEl>
+                                        <p:attrNameLst>
+                                          <p:attrName>style.visibility</p:attrName>
+                                        </p:attrNameLst>
+                                      </p:cBhvr>
+                                      <p:to>
+                                        <p:strVal val="visible"/>
+                                      </p:to>
+                                    </p:set>
+                                    <p:anim calcmode="lin" valueType="num">
+                                      <p:cBhvr>
+                                        <p:cTn id="7" dur="500" fill="hold"/>
+                                        <p:tgtEl>
+                                          <p:spTgt spid="5"/>
+                                        </p:tgtEl>
+                                        <p:attrNameLst>
+                                          <p:attrName>ppt_w</p:attrName>
+                                        </p:attrNameLst>
+                                      </p:cBhvr>
+                                      <p:tavLst>
+                                        <p:tav tm="0">
+                                          <p:val>
+                                            <p:fltVal val="0"/>
+                                          </p:val>
+                                        </p:tav>
+                                        <p:tav tm="100000">
+                                          <p:val>
+                                            <p:strVal val="#ppt_w"/>
+                                          </p:val>
+                                        </p:tav>
+                                      </p:tavLst>
+                                    </p:anim>
+                                    <p:anim calcmode="lin" valueType="num">
+                                      <p:cBhvr>
+                                        <p:cTn id="8" dur="500" fill="hold"/>
+                                        <p:tgtEl>
+                                          <p:spTgt spid="5"/>
+                                        </p:tgtEl>
+                                        <p:attrNameLst>
+                                          <p:attrName>ppt_h</p:attrName>
+                                        </p:attrNameLst>
+                                      </p:cBhvr>
+                                      <p:tavLst>
+                                        <p:tav tm="0">
+                                          <p:val>
+                                            <p:fltVal val="0"/>
+                                          </p:val>
+                                        </p:tav>
+                                        <p:tav tm="100000">
+                                          <p:val>
+                                            <p:strVal val="#ppt_h"/>
+                                          </p:val>
+                                        </p:tav>
+                                      </p:tavLst>
+                                    </p:anim>
+                                    <p:animEffect transition="in" filter="fade">
+                                      <p:cBhvr>
+                                        <p:cTn id="9" dur="500"/>
+                                        <p:tgtEl>
+                                          <p:spTgt spid="5"/>
+                                        </p:tgtEl>
+                                      </p:cBhvr>
+                                    </p:animEffect>
+                                  </p:childTnLst>
+                                </p:cTn>
+                              </p:par>
+                            </p:childTnLst>
+                          </p:cTn>
+                        </p:par>
+                      </p:childTnLst>
+                    </p:cTn>
+                  </p:par>
+                </p:childTnLst>
+              </p:cTn>
+              <p:prevCondLst>
+                <p:cond evt="onPrev" delay="0">
+                  <p:tgtEl>
+                    <p:sldTgt/>
+                  </p:tgtEl>
+                </p:cond>
+              </p:prevCondLst>
+              <p:nextCondLst>
+                <p:cond evt="onNext" delay="0">
+                  <p:tgtEl>
+                    <p:sldTgt/>
+                  </p:tgtEl>
+                </p:cond>
+              </p:nextCondLst>
+            </p:seq>
+          </p:childTnLst>
+        </p:cTn>
+      </p:par>
+    </p:tnLst>
+    <p:bldLst>
+      <p:bldP spid="5" grpId="0"/>
+    </p:bldLst>
+  </p:timing>
+</p:sld>
+</file>
+
+<file path=ppt/slides/slide17.xml><?xml version="1.0" encoding="utf-8"?>
+<p:sld xmlns:a="http://schemas.openxmlformats.org/drawingml/2006/main" xmlns:r="http://schemas.openxmlformats.org/officeDocument/2006/relationships" xmlns:p="http://schemas.openxmlformats.org/presentationml/2006/main">
+  <p:cSld>
+    <p:spTree>
+      <p:nvGrpSpPr>
+        <p:cNvPr id="1" name=""/>
+        <p:cNvGrpSpPr/>
+        <p:nvPr/>
+      </p:nvGrpSpPr>
+      <p:grpSpPr>
+        <a:xfrm>
+          <a:off x="0" y="0"/>
+          <a:ext cx="0" cy="0"/>
+          <a:chOff x="0" y="0"/>
+          <a:chExt cx="0" cy="0"/>
+        </a:xfrm>
+      </p:grpSpPr>
+      <p:sp>
+        <p:nvSpPr>
+          <p:cNvPr id="2" name="Título 1"/>
+          <p:cNvSpPr>
+            <a:spLocks noGrp="1"/>
+          </p:cNvSpPr>
+          <p:nvPr>
+            <p:ph type="title"/>
+          </p:nvPr>
+        </p:nvSpPr>
+        <p:spPr/>
+        <p:txBody>
+          <a:bodyPr>
+            <a:normAutofit fontScale="90000"/>
+          </a:bodyPr>
+          <a:lstStyle/>
+          <a:p>
+            <a:r>
+              <a:rPr lang="pt-BR" dirty="0" smtClean="0"/>
+              <a:t>Fundamentação Teórica</a:t>
+            </a:r>
+            <a:br>
+              <a:rPr lang="pt-BR" dirty="0" smtClean="0"/>
+            </a:br>
+            <a:r>
+              <a:rPr lang="pt-BR" sz="3100" dirty="0" smtClean="0"/>
+              <a:t>Motores de Gabaritos</a:t>
+            </a:r>
+            <a:endParaRPr lang="pt-BR" dirty="0"/>
+          </a:p>
+        </p:txBody>
+      </p:sp>
+      <p:pic>
+        <p:nvPicPr>
+          <p:cNvPr id="4" name="Imagem 3"/>
+          <p:cNvPicPr/>
+          <p:nvPr/>
+        </p:nvPicPr>
+        <p:blipFill>
+          <a:blip r:embed="rId2" cstate="print">
+            <a:extLst>
+              <a:ext uri="{28A0092B-C50C-407E-A947-70E740481C1C}">
+                <a14:useLocalDpi xmlns:a14="http://schemas.microsoft.com/office/drawing/2010/main" val="0"/>
+              </a:ext>
+            </a:extLst>
+          </a:blip>
+          <a:stretch>
+            <a:fillRect/>
+          </a:stretch>
+        </p:blipFill>
+        <p:spPr>
+          <a:xfrm>
+            <a:off x="2483768" y="1772816"/>
+            <a:ext cx="4320480" cy="4320480"/>
+          </a:xfrm>
+          <a:prstGeom prst="rect">
+            <a:avLst/>
+          </a:prstGeom>
+        </p:spPr>
+      </p:pic>
+    </p:spTree>
+    <p:extLst>
+      <p:ext uri="{BB962C8B-B14F-4D97-AF65-F5344CB8AC3E}">
+        <p14:creationId xmlns:p14="http://schemas.microsoft.com/office/powerpoint/2010/main" val="966469963"/>
+      </p:ext>
+    </p:extLst>
+  </p:cSld>
+  <p:clrMapOvr>
+    <a:masterClrMapping/>
+  </p:clrMapOvr>
+  <p:timing>
+    <p:tnLst>
+      <p:par>
+        <p:cTn id="1" dur="indefinite" restart="never" nodeType="tmRoot">
+          <p:childTnLst>
+            <p:seq concurrent="1" nextAc="seek">
+              <p:cTn id="2" dur="indefinite" nodeType="mainSeq">
+                <p:childTnLst>
+                  <p:par>
+                    <p:cTn id="3" fill="hold">
+                      <p:stCondLst>
+                        <p:cond delay="indefinite"/>
+                      </p:stCondLst>
+                      <p:childTnLst>
+                        <p:par>
+                          <p:cTn id="4" fill="hold">
+                            <p:stCondLst>
+                              <p:cond delay="0"/>
+                            </p:stCondLst>
+                            <p:childTnLst>
+                              <p:par>
+                                <p:cTn id="5" presetID="53" presetClass="entr" presetSubtype="16" fill="hold" nodeType="clickEffect">
+                                  <p:stCondLst>
+                                    <p:cond delay="0"/>
+                                  </p:stCondLst>
+                                  <p:childTnLst>
+                                    <p:set>
+                                      <p:cBhvr>
+                                        <p:cTn id="6" dur="1" fill="hold">
+                                          <p:stCondLst>
+                                            <p:cond delay="0"/>
+                                          </p:stCondLst>
+                                        </p:cTn>
+                                        <p:tgtEl>
+                                          <p:spTgt spid="4"/>
+                                        </p:tgtEl>
+                                        <p:attrNameLst>
+                                          <p:attrName>style.visibility</p:attrName>
+                                        </p:attrNameLst>
+                                      </p:cBhvr>
+                                      <p:to>
+                                        <p:strVal val="visible"/>
+                                      </p:to>
+                                    </p:set>
+                                    <p:anim calcmode="lin" valueType="num">
+                                      <p:cBhvr>
+                                        <p:cTn id="7" dur="500" fill="hold"/>
+                                        <p:tgtEl>
+                                          <p:spTgt spid="4"/>
+                                        </p:tgtEl>
+                                        <p:attrNameLst>
+                                          <p:attrName>ppt_w</p:attrName>
+                                        </p:attrNameLst>
+                                      </p:cBhvr>
+                                      <p:tavLst>
+                                        <p:tav tm="0">
+                                          <p:val>
+                                            <p:fltVal val="0"/>
+                                          </p:val>
+                                        </p:tav>
+                                        <p:tav tm="100000">
+                                          <p:val>
+                                            <p:strVal val="#ppt_w"/>
+                                          </p:val>
+                                        </p:tav>
+                                      </p:tavLst>
+                                    </p:anim>
+                                    <p:anim calcmode="lin" valueType="num">
+                                      <p:cBhvr>
+                                        <p:cTn id="8" dur="500" fill="hold"/>
+                                        <p:tgtEl>
+                                          <p:spTgt spid="4"/>
+                                        </p:tgtEl>
+                                        <p:attrNameLst>
+                                          <p:attrName>ppt_h</p:attrName>
+                                        </p:attrNameLst>
+                                      </p:cBhvr>
+                                      <p:tavLst>
+                                        <p:tav tm="0">
+                                          <p:val>
+                                            <p:fltVal val="0"/>
+                                          </p:val>
+                                        </p:tav>
+                                        <p:tav tm="100000">
+                                          <p:val>
+                                            <p:strVal val="#ppt_h"/>
+                                          </p:val>
+                                        </p:tav>
+                                      </p:tavLst>
+                                    </p:anim>
+                                    <p:animEffect transition="in" filter="fade">
+                                      <p:cBhvr>
+                                        <p:cTn id="9" dur="500"/>
+                                        <p:tgtEl>
+                                          <p:spTgt spid="4"/>
+                                        </p:tgtEl>
+                                      </p:cBhvr>
+                                    </p:animEffect>
+                                  </p:childTnLst>
+                                </p:cTn>
+                              </p:par>
+                            </p:childTnLst>
+                          </p:cTn>
+                        </p:par>
+                      </p:childTnLst>
+                    </p:cTn>
+                  </p:par>
+                </p:childTnLst>
+              </p:cTn>
+              <p:prevCondLst>
+                <p:cond evt="onPrev" delay="0">
+                  <p:tgtEl>
+                    <p:sldTgt/>
+                  </p:tgtEl>
+                </p:cond>
+              </p:prevCondLst>
+              <p:nextCondLst>
+                <p:cond evt="onNext" delay="0">
+                  <p:tgtEl>
+                    <p:sldTgt/>
+                  </p:tgtEl>
+                </p:cond>
+              </p:nextCondLst>
+            </p:seq>
+          </p:childTnLst>
+        </p:cTn>
+      </p:par>
+    </p:tnLst>
+  </p:timing>
+</p:sld>
+</file>
+
+<file path=ppt/slides/slide18.xml><?xml version="1.0" encoding="utf-8"?>
+<p:sld xmlns:a="http://schemas.openxmlformats.org/drawingml/2006/main" xmlns:r="http://schemas.openxmlformats.org/officeDocument/2006/relationships" xmlns:p="http://schemas.openxmlformats.org/presentationml/2006/main">
+  <p:cSld>
+    <p:spTree>
+      <p:nvGrpSpPr>
+        <p:cNvPr id="1" name=""/>
+        <p:cNvGrpSpPr/>
+        <p:nvPr/>
+      </p:nvGrpSpPr>
+      <p:grpSpPr>
+        <a:xfrm>
+          <a:off x="0" y="0"/>
+          <a:ext cx="0" cy="0"/>
+          <a:chOff x="0" y="0"/>
+          <a:chExt cx="0" cy="0"/>
+        </a:xfrm>
+      </p:grpSpPr>
+      <p:sp>
+        <p:nvSpPr>
+          <p:cNvPr id="2" name="Título 1"/>
+          <p:cNvSpPr>
+            <a:spLocks noGrp="1"/>
+          </p:cNvSpPr>
+          <p:nvPr>
+            <p:ph type="title"/>
+          </p:nvPr>
+        </p:nvSpPr>
+        <p:spPr/>
+        <p:txBody>
+          <a:bodyPr>
+            <a:normAutofit fontScale="90000"/>
+          </a:bodyPr>
+          <a:lstStyle/>
+          <a:p>
+            <a:r>
+              <a:rPr lang="pt-BR" dirty="0" smtClean="0"/>
+              <a:t>Fundamentação Teórica</a:t>
+            </a:r>
+            <a:br>
+              <a:rPr lang="pt-BR" dirty="0" smtClean="0"/>
+            </a:br>
+            <a:r>
+              <a:rPr lang="pt-BR" dirty="0" smtClean="0"/>
+              <a:t>Motores de Gabaritos</a:t>
+            </a:r>
+            <a:endParaRPr lang="pt-BR" dirty="0"/>
+          </a:p>
+        </p:txBody>
+      </p:sp>
+      <p:sp>
+        <p:nvSpPr>
+          <p:cNvPr id="3" name="Espaço Reservado para Conteúdo 2"/>
+          <p:cNvSpPr>
+            <a:spLocks noGrp="1"/>
+          </p:cNvSpPr>
+          <p:nvPr>
+            <p:ph idx="1"/>
+          </p:nvPr>
+        </p:nvSpPr>
+        <p:spPr>
+          <a:xfrm>
+            <a:off x="467544" y="1916832"/>
+            <a:ext cx="8229600" cy="4344144"/>
+          </a:xfrm>
+        </p:spPr>
+        <p:txBody>
+          <a:bodyPr>
+            <a:normAutofit/>
+          </a:bodyPr>
+          <a:lstStyle/>
+          <a:p>
+            <a:pPr algn="just">
+              <a:lnSpc>
+                <a:spcPct val="150000"/>
+              </a:lnSpc>
+            </a:pPr>
+            <a:r>
+              <a:rPr lang="pt-BR" dirty="0" smtClean="0"/>
+              <a:t>Várias linguagens de programação possuem motores de gabaritos desenvolvidos para facilitar a implementação de aplicações com padrão arquitetural MVC</a:t>
+            </a:r>
+          </a:p>
+          <a:p>
+            <a:pPr marL="0" indent="0" algn="just">
+              <a:lnSpc>
+                <a:spcPct val="150000"/>
+              </a:lnSpc>
+              <a:buNone/>
+            </a:pPr>
+            <a:r>
+              <a:rPr lang="pt-BR" dirty="0" smtClean="0"/>
+              <a:t>Entre várias soluções Java, foram pesquisados:</a:t>
+            </a:r>
+          </a:p>
+          <a:p>
+            <a:pPr algn="just">
+              <a:lnSpc>
+                <a:spcPct val="150000"/>
+              </a:lnSpc>
+            </a:pPr>
+            <a:r>
+              <a:rPr lang="pt-BR" dirty="0" smtClean="0"/>
+              <a:t>Apache Velocity </a:t>
+            </a:r>
+          </a:p>
+          <a:p>
+            <a:pPr algn="just">
+              <a:lnSpc>
+                <a:spcPct val="150000"/>
+              </a:lnSpc>
+            </a:pPr>
+            <a:r>
+              <a:rPr lang="pt-BR" sz="4000" b="1" dirty="0" smtClean="0"/>
+              <a:t>Apache Freemarker</a:t>
+            </a:r>
+            <a:endParaRPr lang="pt-BR" sz="4000" b="1" dirty="0" smtClean="0"/>
+          </a:p>
+          <a:p>
+            <a:endParaRPr lang="pt-BR" dirty="0"/>
+          </a:p>
+        </p:txBody>
+      </p:sp>
+    </p:spTree>
+    <p:extLst>
+      <p:ext uri="{BB962C8B-B14F-4D97-AF65-F5344CB8AC3E}">
+        <p14:creationId xmlns:p14="http://schemas.microsoft.com/office/powerpoint/2010/main" val="1162597756"/>
+      </p:ext>
+    </p:extLst>
+  </p:cSld>
+  <p:clrMapOvr>
+    <a:masterClrMapping/>
+  </p:clrMapOvr>
+  <p:timing>
+    <p:tnLst>
+      <p:par>
+        <p:cTn id="1" dur="indefinite" restart="never" nodeType="tmRoot">
+          <p:childTnLst>
+            <p:seq concurrent="1" nextAc="seek">
+              <p:cTn id="2" dur="indefinite" nodeType="mainSeq">
+                <p:childTnLst>
+                  <p:par>
+                    <p:cTn id="3" fill="hold">
+                      <p:stCondLst>
+                        <p:cond delay="indefinite"/>
+                      </p:stCondLst>
+                      <p:childTnLst>
+                        <p:par>
+                          <p:cTn id="4" fill="hold">
+                            <p:stCondLst>
+                              <p:cond delay="0"/>
+                            </p:stCondLst>
+                            <p:childTnLst>
+                              <p:par>
+                                <p:cTn id="5" presetID="10" presetClass="entr" presetSubtype="0" fill="hold" grpId="0" nodeType="clickEffect">
+                                  <p:stCondLst>
+                                    <p:cond delay="0"/>
+                                  </p:stCondLst>
+                                  <p:childTnLst>
+                                    <p:set>
+                                      <p:cBhvr>
+                                        <p:cTn id="6" dur="1" fill="hold">
+                                          <p:stCondLst>
+                                            <p:cond delay="0"/>
+                                          </p:stCondLst>
+                                        </p:cTn>
+                                        <p:tgtEl>
+                                          <p:spTgt spid="3">
+                                            <p:txEl>
+                                              <p:pRg st="0" end="0"/>
+                                            </p:txEl>
+                                          </p:spTgt>
+                                        </p:tgtEl>
+                                        <p:attrNameLst>
+                                          <p:attrName>style.visibility</p:attrName>
+                                        </p:attrNameLst>
+                                      </p:cBhvr>
+                                      <p:to>
+                                        <p:strVal val="visible"/>
+                                      </p:to>
+                                    </p:set>
+                                    <p:animEffect transition="in" filter="fade">
+                                      <p:cBhvr>
+                                        <p:cTn id="7" dur="500"/>
+                                        <p:tgtEl>
+                                          <p:spTgt spid="3">
+                                            <p:txEl>
+                                              <p:pRg st="0" end="0"/>
+                                            </p:txEl>
+                                          </p:spTgt>
+                                        </p:tgtEl>
+                                      </p:cBhvr>
+                                    </p:animEffect>
+                                  </p:childTnLst>
+                                </p:cTn>
+                              </p:par>
+                            </p:childTnLst>
+                          </p:cTn>
+                        </p:par>
+                      </p:childTnLst>
+                    </p:cTn>
+                  </p:par>
+                  <p:par>
+                    <p:cTn id="8" fill="hold">
+                      <p:stCondLst>
+                        <p:cond delay="indefinite"/>
+                      </p:stCondLst>
+                      <p:childTnLst>
+                        <p:par>
+                          <p:cTn id="9" fill="hold">
+                            <p:stCondLst>
+                              <p:cond delay="0"/>
+                            </p:stCondLst>
+                            <p:childTnLst>
+                              <p:par>
+                                <p:cTn id="10" presetID="10" presetClass="entr" presetSubtype="0" fill="hold" grpId="0" nodeType="clickEffect">
+                                  <p:stCondLst>
+                                    <p:cond delay="0"/>
+                                  </p:stCondLst>
+                                  <p:childTnLst>
+                                    <p:set>
+                                      <p:cBhvr>
+                                        <p:cTn id="11" dur="1" fill="hold">
+                                          <p:stCondLst>
+                                            <p:cond delay="0"/>
+                                          </p:stCondLst>
+                                        </p:cTn>
+                                        <p:tgtEl>
+                                          <p:spTgt spid="3">
+                                            <p:txEl>
+                                              <p:pRg st="1" end="1"/>
+                                            </p:txEl>
+                                          </p:spTgt>
+                                        </p:tgtEl>
+                                        <p:attrNameLst>
+                                          <p:attrName>style.visibility</p:attrName>
+                                        </p:attrNameLst>
+                                      </p:cBhvr>
+                                      <p:to>
+                                        <p:strVal val="visible"/>
+                                      </p:to>
+                                    </p:set>
+                                    <p:animEffect transition="in" filter="fade">
+                                      <p:cBhvr>
+                                        <p:cTn id="12" dur="500"/>
+                                        <p:tgtEl>
+                                          <p:spTgt spid="3">
+                                            <p:txEl>
+                                              <p:pRg st="1" end="1"/>
+                                            </p:txEl>
+                                          </p:spTgt>
+                                        </p:tgtEl>
+                                      </p:cBhvr>
+                                    </p:animEffect>
+                                  </p:childTnLst>
+                                </p:cTn>
+                              </p:par>
+                            </p:childTnLst>
+                          </p:cTn>
+                        </p:par>
+                      </p:childTnLst>
+                    </p:cTn>
+                  </p:par>
+                  <p:par>
+                    <p:cTn id="13" fill="hold">
+                      <p:stCondLst>
+                        <p:cond delay="indefinite"/>
+                      </p:stCondLst>
+                      <p:childTnLst>
+                        <p:par>
+                          <p:cTn id="14" fill="hold">
+                            <p:stCondLst>
+                              <p:cond delay="0"/>
+                            </p:stCondLst>
+                            <p:childTnLst>
+                              <p:par>
+                                <p:cTn id="15" presetID="10" presetClass="entr" presetSubtype="0" fill="hold" grpId="0" nodeType="clickEffect">
+                                  <p:stCondLst>
+                                    <p:cond delay="0"/>
+                                  </p:stCondLst>
+                                  <p:childTnLst>
+                                    <p:set>
+                                      <p:cBhvr>
+                                        <p:cTn id="16" dur="1" fill="hold">
+                                          <p:stCondLst>
+                                            <p:cond delay="0"/>
+                                          </p:stCondLst>
+                                        </p:cTn>
+                                        <p:tgtEl>
+                                          <p:spTgt spid="3">
+                                            <p:txEl>
+                                              <p:pRg st="2" end="2"/>
+                                            </p:txEl>
+                                          </p:spTgt>
+                                        </p:tgtEl>
+                                        <p:attrNameLst>
+                                          <p:attrName>style.visibility</p:attrName>
+                                        </p:attrNameLst>
+                                      </p:cBhvr>
+                                      <p:to>
+                                        <p:strVal val="visible"/>
+                                      </p:to>
+                                    </p:set>
+                                    <p:animEffect transition="in" filter="fade">
+                                      <p:cBhvr>
+                                        <p:cTn id="17" dur="500"/>
+                                        <p:tgtEl>
+                                          <p:spTgt spid="3">
+                                            <p:txEl>
+                                              <p:pRg st="2" end="2"/>
+                                            </p:txEl>
+                                          </p:spTgt>
+                                        </p:tgtEl>
+                                      </p:cBhvr>
+                                    </p:animEffect>
+                                  </p:childTnLst>
+                                </p:cTn>
+                              </p:par>
+                            </p:childTnLst>
+                          </p:cTn>
+                        </p:par>
+                      </p:childTnLst>
+                    </p:cTn>
+                  </p:par>
+                  <p:par>
+                    <p:cTn id="18" fill="hold">
+                      <p:stCondLst>
+                        <p:cond delay="indefinite"/>
+                      </p:stCondLst>
+                      <p:childTnLst>
+                        <p:par>
+                          <p:cTn id="19" fill="hold">
+                            <p:stCondLst>
+                              <p:cond delay="0"/>
+                            </p:stCondLst>
+                            <p:childTnLst>
+                              <p:par>
+                                <p:cTn id="20" presetID="10" presetClass="entr" presetSubtype="0" fill="hold" grpId="0" nodeType="clickEffect">
+                                  <p:stCondLst>
+                                    <p:cond delay="0"/>
+                                  </p:stCondLst>
+                                  <p:childTnLst>
+                                    <p:set>
+                                      <p:cBhvr>
+                                        <p:cTn id="21" dur="1" fill="hold">
+                                          <p:stCondLst>
+                                            <p:cond delay="0"/>
+                                          </p:stCondLst>
+                                        </p:cTn>
+                                        <p:tgtEl>
+                                          <p:spTgt spid="3">
+                                            <p:txEl>
+                                              <p:pRg st="3" end="3"/>
+                                            </p:txEl>
+                                          </p:spTgt>
+                                        </p:tgtEl>
+                                        <p:attrNameLst>
+                                          <p:attrName>style.visibility</p:attrName>
+                                        </p:attrNameLst>
+                                      </p:cBhvr>
+                                      <p:to>
+                                        <p:strVal val="visible"/>
+                                      </p:to>
+                                    </p:set>
+                                    <p:animEffect transition="in" filter="fade">
+                                      <p:cBhvr>
+                                        <p:cTn id="22" dur="500"/>
+                                        <p:tgtEl>
+                                          <p:spTgt spid="3">
+                                            <p:txEl>
+                                              <p:pRg st="3" end="3"/>
+                                            </p:txEl>
+                                          </p:spTgt>
+                                        </p:tgtEl>
+                                      </p:cBhvr>
+                                    </p:animEffect>
+                                  </p:childTnLst>
+                                </p:cTn>
+                              </p:par>
+                            </p:childTnLst>
+                          </p:cTn>
+                        </p:par>
+                      </p:childTnLst>
+                    </p:cTn>
+                  </p:par>
+                </p:childTnLst>
+              </p:cTn>
+              <p:prevCondLst>
+                <p:cond evt="onPrev" delay="0">
+                  <p:tgtEl>
+                    <p:sldTgt/>
+                  </p:tgtEl>
+                </p:cond>
+              </p:prevCondLst>
+              <p:nextCondLst>
+                <p:cond evt="onNext" delay="0">
+                  <p:tgtEl>
+                    <p:sldTgt/>
+                  </p:tgtEl>
+                </p:cond>
+              </p:nextCondLst>
+            </p:seq>
+          </p:childTnLst>
+        </p:cTn>
+      </p:par>
+    </p:tnLst>
+    <p:bldLst>
+      <p:bldP spid="3" grpId="0" build="p"/>
+    </p:bldLst>
+  </p:timing>
+</p:sld>
+</file>
+
+<file path=ppt/slides/slide19.xml><?xml version="1.0" encoding="utf-8"?>
+<p:sld xmlns:a="http://schemas.openxmlformats.org/drawingml/2006/main" xmlns:r="http://schemas.openxmlformats.org/officeDocument/2006/relationships" xmlns:p="http://schemas.openxmlformats.org/presentationml/2006/main">
+  <p:cSld>
+    <p:spTree>
+      <p:nvGrpSpPr>
+        <p:cNvPr id="1" name=""/>
+        <p:cNvGrpSpPr/>
+        <p:nvPr/>
+      </p:nvGrpSpPr>
+      <p:grpSpPr>
+        <a:xfrm>
+          <a:off x="0" y="0"/>
+          <a:ext cx="0" cy="0"/>
+          <a:chOff x="0" y="0"/>
+          <a:chExt cx="0" cy="0"/>
+        </a:xfrm>
+      </p:grpSpPr>
+      <p:sp>
+        <p:nvSpPr>
+          <p:cNvPr id="2" name="Título 1"/>
+          <p:cNvSpPr>
+            <a:spLocks noGrp="1"/>
+          </p:cNvSpPr>
+          <p:nvPr>
+            <p:ph type="title"/>
+          </p:nvPr>
+        </p:nvSpPr>
+        <p:spPr/>
+        <p:txBody>
+          <a:bodyPr>
+            <a:normAutofit fontScale="90000"/>
+          </a:bodyPr>
+          <a:lstStyle/>
+          <a:p>
+            <a:r>
+              <a:rPr lang="pt-BR" dirty="0" smtClean="0"/>
+              <a:t>Fundamentação Teórica</a:t>
+            </a:r>
+            <a:br>
+              <a:rPr lang="pt-BR" dirty="0" smtClean="0"/>
+            </a:br>
+            <a:r>
+              <a:rPr lang="pt-BR" dirty="0" smtClean="0"/>
+              <a:t>Apache Freemarker</a:t>
+            </a:r>
+            <a:endParaRPr lang="pt-BR" dirty="0"/>
+          </a:p>
+        </p:txBody>
+      </p:sp>
+      <p:sp>
+        <p:nvSpPr>
+          <p:cNvPr id="3" name="Espaço Reservado para Conteúdo 2"/>
+          <p:cNvSpPr>
+            <a:spLocks noGrp="1"/>
+          </p:cNvSpPr>
+          <p:nvPr>
+            <p:ph idx="1"/>
+          </p:nvPr>
+        </p:nvSpPr>
+        <p:spPr>
+          <a:xfrm>
+            <a:off x="467544" y="1916832"/>
+            <a:ext cx="8229600" cy="4344144"/>
+          </a:xfrm>
+        </p:spPr>
+        <p:txBody>
+          <a:bodyPr>
+            <a:normAutofit lnSpcReduction="10000"/>
+          </a:bodyPr>
+          <a:lstStyle/>
+          <a:p>
+            <a:pPr algn="just">
+              <a:lnSpc>
+                <a:spcPct val="150000"/>
+              </a:lnSpc>
+            </a:pPr>
+            <a:r>
+              <a:rPr lang="pt-BR" dirty="0" smtClean="0"/>
+              <a:t>(KRUEGGER,1992) Reuso de software é o processo de se criar software a partir de software existente;</a:t>
+            </a:r>
+          </a:p>
+          <a:p>
+            <a:pPr algn="just">
+              <a:lnSpc>
+                <a:spcPct val="150000"/>
+              </a:lnSpc>
+            </a:pPr>
+            <a:r>
+              <a:rPr lang="pt-BR" dirty="0"/>
+              <a:t>(SHIMABUKURO JUNIOR, 2006</a:t>
+            </a:r>
+            <a:r>
+              <a:rPr lang="pt-BR" dirty="0" smtClean="0"/>
+              <a:t>) Código fonte, diagramas, documentação e qualquer outro artefato pode e deve ser utilizado para acelerar o processo de desenvolvimento de novas soluções;</a:t>
+            </a:r>
+          </a:p>
+          <a:p>
+            <a:pPr algn="just">
+              <a:lnSpc>
+                <a:spcPct val="150000"/>
+              </a:lnSpc>
+            </a:pPr>
+            <a:r>
+              <a:rPr lang="pt-BR" dirty="0"/>
+              <a:t>(SOMMERVILLE, 2013</a:t>
+            </a:r>
+            <a:r>
+              <a:rPr lang="pt-BR" dirty="0" smtClean="0"/>
+              <a:t>) O movimento de software livre tem impulsionado o reuso;</a:t>
+            </a:r>
+          </a:p>
+          <a:p>
+            <a:endParaRPr lang="pt-BR" dirty="0"/>
+          </a:p>
+        </p:txBody>
+      </p:sp>
+    </p:spTree>
+    <p:extLst>
+      <p:ext uri="{BB962C8B-B14F-4D97-AF65-F5344CB8AC3E}">
+        <p14:creationId xmlns:p14="http://schemas.microsoft.com/office/powerpoint/2010/main" val="3771295850"/>
       </p:ext>
     </p:extLst>
   </p:cSld>
@@ -6675,7 +10736,7 @@
                             </p:stCondLst>
                             <p:childTnLst>
                               <p:par>
-                                <p:cTn id="10" presetID="10" presetClass="entr" presetSubtype="0" fill="hold" nodeType="clickEffect">
+                                <p:cTn id="10" presetID="10" presetClass="entr" presetSubtype="0" fill="hold" grpId="0" nodeType="clickEffect">
                                   <p:stCondLst>
                                     <p:cond delay="0"/>
                                   </p:stCondLst>
@@ -6717,15 +10778,33 @@
                                   </p:childTnLst>
                                 </p:cTn>
                               </p:par>
+                            </p:childTnLst>
+                          </p:cTn>
+                        </p:par>
+                      </p:childTnLst>
+                    </p:cTn>
+                  </p:par>
+                  <p:par>
+                    <p:cTn id="13" fill="hold">
+                      <p:stCondLst>
+                        <p:cond delay="indefinite"/>
+                      </p:stCondLst>
+                      <p:childTnLst>
+                        <p:par>
+                          <p:cTn id="14" fill="hold">
+                            <p:stCondLst>
+                              <p:cond delay="0"/>
+                            </p:stCondLst>
+                            <p:childTnLst>
                               <p:par>
-                                <p:cTn id="13" presetID="10" presetClass="entr" presetSubtype="0" fill="hold" nodeType="withEffect">
+                                <p:cTn id="15" presetID="10" presetClass="entr" presetSubtype="0" fill="hold" grpId="0" nodeType="clickEffect">
                                   <p:stCondLst>
                                     <p:cond delay="0"/>
                                   </p:stCondLst>
                                   <p:childTnLst>
                                     <p:set>
                                       <p:cBhvr>
-                                        <p:cTn id="14" dur="1" fill="hold">
+                                        <p:cTn id="16" dur="1" fill="hold">
                                           <p:stCondLst>
                                             <p:cond delay="0"/>
                                           </p:stCondLst>
@@ -6747,7 +10826,7 @@
                                     </p:set>
                                     <p:animEffect transition="in" filter="fade">
                                       <p:cBhvr>
-                                        <p:cTn id="15" dur="500"/>
+                                        <p:cTn id="17" dur="500"/>
                                         <p:tgtEl>
                                           <p:spTgt spid="3">
                                             <p:txEl>
@@ -6760,15 +10839,33 @@
                                   </p:childTnLst>
                                 </p:cTn>
                               </p:par>
+                            </p:childTnLst>
+                          </p:cTn>
+                        </p:par>
+                      </p:childTnLst>
+                    </p:cTn>
+                  </p:par>
+                  <p:par>
+                    <p:cTn id="18" fill="hold">
+                      <p:stCondLst>
+                        <p:cond delay="indefinite"/>
+                      </p:stCondLst>
+                      <p:childTnLst>
+                        <p:par>
+                          <p:cTn id="19" fill="hold">
+                            <p:stCondLst>
+                              <p:cond delay="0"/>
+                            </p:stCondLst>
+                            <p:childTnLst>
                               <p:par>
-                                <p:cTn id="16" presetID="10" presetClass="entr" presetSubtype="0" fill="hold" nodeType="withEffect">
+                                <p:cTn id="20" presetID="10" presetClass="entr" presetSubtype="0" fill="hold" grpId="0" nodeType="clickEffect">
                                   <p:stCondLst>
                                     <p:cond delay="0"/>
                                   </p:stCondLst>
                                   <p:childTnLst>
                                     <p:set>
                                       <p:cBhvr>
-                                        <p:cTn id="17" dur="1" fill="hold">
+                                        <p:cTn id="21" dur="1" fill="hold">
                                           <p:stCondLst>
                                             <p:cond delay="0"/>
                                           </p:stCondLst>
@@ -6790,7 +10887,7 @@
                                     </p:set>
                                     <p:animEffect transition="in" filter="fade">
                                       <p:cBhvr>
-                                        <p:cTn id="18" dur="500"/>
+                                        <p:cTn id="22" dur="500"/>
                                         <p:tgtEl>
                                           <p:spTgt spid="3">
                                             <p:txEl>

</xml_diff>